<commit_message>
2014-12-19-user update - blomdhal
</commit_message>
<xml_diff>
--- a/00-iamroot11c/users/blomdhal/temp/temp.pptx
+++ b/00-iamroot11c/users/blomdhal/temp/temp.pptx
@@ -7,6 +7,7 @@
   <p:sldIdLst>
     <p:sldId id="256" r:id="rId2"/>
     <p:sldId id="257" r:id="rId3"/>
+    <p:sldId id="258" r:id="rId4"/>
   </p:sldIdLst>
   <p:sldSz cx="9144000" cy="6858000" type="screen4x3"/>
   <p:notesSz cx="6858000" cy="9144000"/>
@@ -289,7 +290,7 @@
           <a:p>
             <a:fld id="{45806C50-3C04-4827-BE75-29D46D82EADB}" type="datetimeFigureOut">
               <a:rPr lang="ko-KR" altLang="en-US" smtClean="0"/>
-              <a:t>2014-12-15</a:t>
+              <a:t>2014-12-18</a:t>
             </a:fld>
             <a:endParaRPr lang="ko-KR" altLang="en-US"/>
           </a:p>
@@ -459,7 +460,7 @@
           <a:p>
             <a:fld id="{45806C50-3C04-4827-BE75-29D46D82EADB}" type="datetimeFigureOut">
               <a:rPr lang="ko-KR" altLang="en-US" smtClean="0"/>
-              <a:t>2014-12-15</a:t>
+              <a:t>2014-12-18</a:t>
             </a:fld>
             <a:endParaRPr lang="ko-KR" altLang="en-US"/>
           </a:p>
@@ -639,7 +640,7 @@
           <a:p>
             <a:fld id="{45806C50-3C04-4827-BE75-29D46D82EADB}" type="datetimeFigureOut">
               <a:rPr lang="ko-KR" altLang="en-US" smtClean="0"/>
-              <a:t>2014-12-15</a:t>
+              <a:t>2014-12-18</a:t>
             </a:fld>
             <a:endParaRPr lang="ko-KR" altLang="en-US"/>
           </a:p>
@@ -809,7 +810,7 @@
           <a:p>
             <a:fld id="{45806C50-3C04-4827-BE75-29D46D82EADB}" type="datetimeFigureOut">
               <a:rPr lang="ko-KR" altLang="en-US" smtClean="0"/>
-              <a:t>2014-12-15</a:t>
+              <a:t>2014-12-18</a:t>
             </a:fld>
             <a:endParaRPr lang="ko-KR" altLang="en-US"/>
           </a:p>
@@ -1055,7 +1056,7 @@
           <a:p>
             <a:fld id="{45806C50-3C04-4827-BE75-29D46D82EADB}" type="datetimeFigureOut">
               <a:rPr lang="ko-KR" altLang="en-US" smtClean="0"/>
-              <a:t>2014-12-15</a:t>
+              <a:t>2014-12-18</a:t>
             </a:fld>
             <a:endParaRPr lang="ko-KR" altLang="en-US"/>
           </a:p>
@@ -1343,7 +1344,7 @@
           <a:p>
             <a:fld id="{45806C50-3C04-4827-BE75-29D46D82EADB}" type="datetimeFigureOut">
               <a:rPr lang="ko-KR" altLang="en-US" smtClean="0"/>
-              <a:t>2014-12-15</a:t>
+              <a:t>2014-12-18</a:t>
             </a:fld>
             <a:endParaRPr lang="ko-KR" altLang="en-US"/>
           </a:p>
@@ -1765,7 +1766,7 @@
           <a:p>
             <a:fld id="{45806C50-3C04-4827-BE75-29D46D82EADB}" type="datetimeFigureOut">
               <a:rPr lang="ko-KR" altLang="en-US" smtClean="0"/>
-              <a:t>2014-12-15</a:t>
+              <a:t>2014-12-18</a:t>
             </a:fld>
             <a:endParaRPr lang="ko-KR" altLang="en-US"/>
           </a:p>
@@ -1883,7 +1884,7 @@
           <a:p>
             <a:fld id="{45806C50-3C04-4827-BE75-29D46D82EADB}" type="datetimeFigureOut">
               <a:rPr lang="ko-KR" altLang="en-US" smtClean="0"/>
-              <a:t>2014-12-15</a:t>
+              <a:t>2014-12-18</a:t>
             </a:fld>
             <a:endParaRPr lang="ko-KR" altLang="en-US"/>
           </a:p>
@@ -1978,7 +1979,7 @@
           <a:p>
             <a:fld id="{45806C50-3C04-4827-BE75-29D46D82EADB}" type="datetimeFigureOut">
               <a:rPr lang="ko-KR" altLang="en-US" smtClean="0"/>
-              <a:t>2014-12-15</a:t>
+              <a:t>2014-12-18</a:t>
             </a:fld>
             <a:endParaRPr lang="ko-KR" altLang="en-US"/>
           </a:p>
@@ -2255,7 +2256,7 @@
           <a:p>
             <a:fld id="{45806C50-3C04-4827-BE75-29D46D82EADB}" type="datetimeFigureOut">
               <a:rPr lang="ko-KR" altLang="en-US" smtClean="0"/>
-              <a:t>2014-12-15</a:t>
+              <a:t>2014-12-18</a:t>
             </a:fld>
             <a:endParaRPr lang="ko-KR" altLang="en-US"/>
           </a:p>
@@ -2508,7 +2509,7 @@
           <a:p>
             <a:fld id="{45806C50-3C04-4827-BE75-29D46D82EADB}" type="datetimeFigureOut">
               <a:rPr lang="ko-KR" altLang="en-US" smtClean="0"/>
-              <a:t>2014-12-15</a:t>
+              <a:t>2014-12-18</a:t>
             </a:fld>
             <a:endParaRPr lang="ko-KR" altLang="en-US"/>
           </a:p>
@@ -2721,7 +2722,7 @@
           <a:p>
             <a:fld id="{45806C50-3C04-4827-BE75-29D46D82EADB}" type="datetimeFigureOut">
               <a:rPr lang="ko-KR" altLang="en-US" smtClean="0"/>
-              <a:t>2014-12-15</a:t>
+              <a:t>2014-12-18</a:t>
             </a:fld>
             <a:endParaRPr lang="ko-KR" altLang="en-US"/>
           </a:p>
@@ -7480,6 +7481,2687 @@
 </p:sld>
 </file>
 
+<file path=ppt/slides/slide3.xml><?xml version="1.0" encoding="utf-8"?>
+<p:sld xmlns:a="http://schemas.openxmlformats.org/drawingml/2006/main" xmlns:r="http://schemas.openxmlformats.org/officeDocument/2006/relationships" xmlns:p="http://schemas.openxmlformats.org/presentationml/2006/main">
+  <p:cSld>
+    <p:spTree>
+      <p:nvGrpSpPr>
+        <p:cNvPr id="1" name=""/>
+        <p:cNvGrpSpPr/>
+        <p:nvPr/>
+      </p:nvGrpSpPr>
+      <p:grpSpPr>
+        <a:xfrm>
+          <a:off x="0" y="0"/>
+          <a:ext cx="0" cy="0"/>
+          <a:chOff x="0" y="0"/>
+          <a:chExt cx="0" cy="0"/>
+        </a:xfrm>
+      </p:grpSpPr>
+      <p:sp>
+        <p:nvSpPr>
+          <p:cNvPr id="4" name="TextBox 3"/>
+          <p:cNvSpPr txBox="1"/>
+          <p:nvPr/>
+        </p:nvSpPr>
+        <p:spPr>
+          <a:xfrm>
+            <a:off x="323528" y="188640"/>
+            <a:ext cx="8568952" cy="369332"/>
+          </a:xfrm>
+          <a:prstGeom prst="rect">
+            <a:avLst/>
+          </a:prstGeom>
+          <a:noFill/>
+        </p:spPr>
+        <p:txBody>
+          <a:bodyPr wrap="square" rtlCol="0">
+            <a:spAutoFit/>
+          </a:bodyPr>
+          <a:lstStyle/>
+          <a:p>
+            <a:r>
+              <a:rPr lang="en-US" altLang="ko-KR" b="1" dirty="0" err="1" smtClean="0"/>
+              <a:t>List_add</a:t>
+            </a:r>
+            <a:r>
+              <a:rPr lang="en-US" altLang="ko-KR" b="1" dirty="0" smtClean="0"/>
+              <a:t>()</a:t>
+            </a:r>
+            <a:r>
+              <a:rPr lang="ko-KR" altLang="en-US" b="1" dirty="0" smtClean="0"/>
+              <a:t>와 </a:t>
+            </a:r>
+            <a:r>
+              <a:rPr lang="en-US" altLang="ko-KR" b="1" dirty="0" err="1" smtClean="0"/>
+              <a:t>List_add_tail</a:t>
+            </a:r>
+            <a:r>
+              <a:rPr lang="en-US" altLang="ko-KR" b="1" dirty="0" smtClean="0"/>
+              <a:t>()</a:t>
+            </a:r>
+            <a:r>
+              <a:rPr lang="ko-KR" altLang="en-US" b="1" dirty="0" smtClean="0"/>
+              <a:t>의 차이점</a:t>
+            </a:r>
+            <a:endParaRPr lang="en-US" altLang="ko-KR" b="1" dirty="0" smtClean="0"/>
+          </a:p>
+        </p:txBody>
+      </p:sp>
+      <p:grpSp>
+        <p:nvGrpSpPr>
+          <p:cNvPr id="9" name="그룹 8"/>
+          <p:cNvGrpSpPr/>
+          <p:nvPr/>
+        </p:nvGrpSpPr>
+        <p:grpSpPr>
+          <a:xfrm>
+            <a:off x="407655" y="1412776"/>
+            <a:ext cx="1224136" cy="360040"/>
+            <a:chOff x="971600" y="1268760"/>
+            <a:chExt cx="2088232" cy="576064"/>
+          </a:xfrm>
+        </p:grpSpPr>
+        <p:sp>
+          <p:nvSpPr>
+            <p:cNvPr id="6" name="모서리가 둥근 직사각형 5"/>
+            <p:cNvSpPr/>
+            <p:nvPr/>
+          </p:nvSpPr>
+          <p:spPr>
+            <a:xfrm>
+              <a:off x="971600" y="1268760"/>
+              <a:ext cx="2088232" cy="576064"/>
+            </a:xfrm>
+            <a:prstGeom prst="roundRect">
+              <a:avLst/>
+            </a:prstGeom>
+          </p:spPr>
+          <p:style>
+            <a:lnRef idx="2">
+              <a:schemeClr val="dk1"/>
+            </a:lnRef>
+            <a:fillRef idx="1">
+              <a:schemeClr val="lt1"/>
+            </a:fillRef>
+            <a:effectRef idx="0">
+              <a:schemeClr val="dk1"/>
+            </a:effectRef>
+            <a:fontRef idx="minor">
+              <a:schemeClr val="dk1"/>
+            </a:fontRef>
+          </p:style>
+          <p:txBody>
+            <a:bodyPr rtlCol="0" anchor="ctr"/>
+            <a:lstStyle/>
+            <a:p>
+              <a:pPr algn="ctr"/>
+              <a:r>
+                <a:rPr lang="en-US" altLang="ko-KR" dirty="0" smtClean="0"/>
+                <a:t>head</a:t>
+              </a:r>
+              <a:endParaRPr lang="ko-KR" altLang="en-US" dirty="0"/>
+            </a:p>
+          </p:txBody>
+        </p:sp>
+        <p:sp>
+          <p:nvSpPr>
+            <p:cNvPr id="7" name="모서리가 둥근 직사각형 6"/>
+            <p:cNvSpPr/>
+            <p:nvPr/>
+          </p:nvSpPr>
+          <p:spPr>
+            <a:xfrm>
+              <a:off x="971600" y="1268760"/>
+              <a:ext cx="288032" cy="576064"/>
+            </a:xfrm>
+            <a:prstGeom prst="roundRect">
+              <a:avLst/>
+            </a:prstGeom>
+          </p:spPr>
+          <p:style>
+            <a:lnRef idx="2">
+              <a:schemeClr val="dk1"/>
+            </a:lnRef>
+            <a:fillRef idx="1">
+              <a:schemeClr val="lt1"/>
+            </a:fillRef>
+            <a:effectRef idx="0">
+              <a:schemeClr val="dk1"/>
+            </a:effectRef>
+            <a:fontRef idx="minor">
+              <a:schemeClr val="dk1"/>
+            </a:fontRef>
+          </p:style>
+          <p:txBody>
+            <a:bodyPr rtlCol="0" anchor="ctr"/>
+            <a:lstStyle/>
+            <a:p>
+              <a:pPr algn="ctr"/>
+              <a:endParaRPr lang="ko-KR" altLang="en-US"/>
+            </a:p>
+          </p:txBody>
+        </p:sp>
+        <p:sp>
+          <p:nvSpPr>
+            <p:cNvPr id="8" name="모서리가 둥근 직사각형 7"/>
+            <p:cNvSpPr/>
+            <p:nvPr/>
+          </p:nvSpPr>
+          <p:spPr>
+            <a:xfrm>
+              <a:off x="2771800" y="1268760"/>
+              <a:ext cx="288032" cy="576064"/>
+            </a:xfrm>
+            <a:prstGeom prst="roundRect">
+              <a:avLst/>
+            </a:prstGeom>
+          </p:spPr>
+          <p:style>
+            <a:lnRef idx="2">
+              <a:schemeClr val="dk1"/>
+            </a:lnRef>
+            <a:fillRef idx="1">
+              <a:schemeClr val="lt1"/>
+            </a:fillRef>
+            <a:effectRef idx="0">
+              <a:schemeClr val="dk1"/>
+            </a:effectRef>
+            <a:fontRef idx="minor">
+              <a:schemeClr val="dk1"/>
+            </a:fontRef>
+          </p:style>
+          <p:txBody>
+            <a:bodyPr rtlCol="0" anchor="ctr"/>
+            <a:lstStyle/>
+            <a:p>
+              <a:pPr algn="ctr"/>
+              <a:endParaRPr lang="ko-KR" altLang="en-US"/>
+            </a:p>
+          </p:txBody>
+        </p:sp>
+      </p:grpSp>
+      <p:grpSp>
+        <p:nvGrpSpPr>
+          <p:cNvPr id="10" name="그룹 9"/>
+          <p:cNvGrpSpPr/>
+          <p:nvPr/>
+        </p:nvGrpSpPr>
+        <p:grpSpPr>
+          <a:xfrm>
+            <a:off x="2273327" y="1412776"/>
+            <a:ext cx="1224136" cy="360040"/>
+            <a:chOff x="971600" y="1268760"/>
+            <a:chExt cx="2088232" cy="576064"/>
+          </a:xfrm>
+        </p:grpSpPr>
+        <p:sp>
+          <p:nvSpPr>
+            <p:cNvPr id="11" name="모서리가 둥근 직사각형 10"/>
+            <p:cNvSpPr/>
+            <p:nvPr/>
+          </p:nvSpPr>
+          <p:spPr>
+            <a:xfrm>
+              <a:off x="971600" y="1268760"/>
+              <a:ext cx="2088232" cy="576064"/>
+            </a:xfrm>
+            <a:prstGeom prst="roundRect">
+              <a:avLst/>
+            </a:prstGeom>
+          </p:spPr>
+          <p:style>
+            <a:lnRef idx="2">
+              <a:schemeClr val="dk1"/>
+            </a:lnRef>
+            <a:fillRef idx="1">
+              <a:schemeClr val="lt1"/>
+            </a:fillRef>
+            <a:effectRef idx="0">
+              <a:schemeClr val="dk1"/>
+            </a:effectRef>
+            <a:fontRef idx="minor">
+              <a:schemeClr val="dk1"/>
+            </a:fontRef>
+          </p:style>
+          <p:txBody>
+            <a:bodyPr rtlCol="0" anchor="ctr"/>
+            <a:lstStyle/>
+            <a:p>
+              <a:pPr algn="ctr"/>
+              <a:r>
+                <a:rPr lang="en-US" altLang="ko-KR" dirty="0" smtClean="0"/>
+                <a:t>0</a:t>
+              </a:r>
+              <a:endParaRPr lang="ko-KR" altLang="en-US" dirty="0"/>
+            </a:p>
+          </p:txBody>
+        </p:sp>
+        <p:sp>
+          <p:nvSpPr>
+            <p:cNvPr id="12" name="모서리가 둥근 직사각형 11"/>
+            <p:cNvSpPr/>
+            <p:nvPr/>
+          </p:nvSpPr>
+          <p:spPr>
+            <a:xfrm>
+              <a:off x="971600" y="1268760"/>
+              <a:ext cx="288032" cy="576064"/>
+            </a:xfrm>
+            <a:prstGeom prst="roundRect">
+              <a:avLst/>
+            </a:prstGeom>
+          </p:spPr>
+          <p:style>
+            <a:lnRef idx="2">
+              <a:schemeClr val="dk1"/>
+            </a:lnRef>
+            <a:fillRef idx="1">
+              <a:schemeClr val="lt1"/>
+            </a:fillRef>
+            <a:effectRef idx="0">
+              <a:schemeClr val="dk1"/>
+            </a:effectRef>
+            <a:fontRef idx="minor">
+              <a:schemeClr val="dk1"/>
+            </a:fontRef>
+          </p:style>
+          <p:txBody>
+            <a:bodyPr rtlCol="0" anchor="ctr"/>
+            <a:lstStyle/>
+            <a:p>
+              <a:pPr algn="ctr"/>
+              <a:endParaRPr lang="ko-KR" altLang="en-US"/>
+            </a:p>
+          </p:txBody>
+        </p:sp>
+        <p:sp>
+          <p:nvSpPr>
+            <p:cNvPr id="13" name="모서리가 둥근 직사각형 12"/>
+            <p:cNvSpPr/>
+            <p:nvPr/>
+          </p:nvSpPr>
+          <p:spPr>
+            <a:xfrm>
+              <a:off x="2771800" y="1268760"/>
+              <a:ext cx="288032" cy="576064"/>
+            </a:xfrm>
+            <a:prstGeom prst="roundRect">
+              <a:avLst/>
+            </a:prstGeom>
+          </p:spPr>
+          <p:style>
+            <a:lnRef idx="2">
+              <a:schemeClr val="dk1"/>
+            </a:lnRef>
+            <a:fillRef idx="1">
+              <a:schemeClr val="lt1"/>
+            </a:fillRef>
+            <a:effectRef idx="0">
+              <a:schemeClr val="dk1"/>
+            </a:effectRef>
+            <a:fontRef idx="minor">
+              <a:schemeClr val="dk1"/>
+            </a:fontRef>
+          </p:style>
+          <p:txBody>
+            <a:bodyPr rtlCol="0" anchor="ctr"/>
+            <a:lstStyle/>
+            <a:p>
+              <a:pPr algn="ctr"/>
+              <a:endParaRPr lang="ko-KR" altLang="en-US"/>
+            </a:p>
+          </p:txBody>
+        </p:sp>
+      </p:grpSp>
+      <p:sp>
+        <p:nvSpPr>
+          <p:cNvPr id="18" name="TextBox 17"/>
+          <p:cNvSpPr txBox="1"/>
+          <p:nvPr/>
+        </p:nvSpPr>
+        <p:spPr>
+          <a:xfrm>
+            <a:off x="318232" y="764704"/>
+            <a:ext cx="2381560" cy="369332"/>
+          </a:xfrm>
+          <a:prstGeom prst="rect">
+            <a:avLst/>
+          </a:prstGeom>
+          <a:noFill/>
+        </p:spPr>
+        <p:txBody>
+          <a:bodyPr wrap="square" rtlCol="0">
+            <a:spAutoFit/>
+          </a:bodyPr>
+          <a:lstStyle/>
+          <a:p>
+            <a:r>
+              <a:rPr lang="en-US" altLang="ko-KR" b="1" dirty="0" err="1" smtClean="0"/>
+              <a:t>List_add</a:t>
+            </a:r>
+            <a:r>
+              <a:rPr lang="en-US" altLang="ko-KR" b="1" dirty="0" smtClean="0"/>
+              <a:t>()</a:t>
+            </a:r>
+            <a:endParaRPr lang="ko-KR" altLang="en-US" b="1" dirty="0"/>
+          </a:p>
+        </p:txBody>
+      </p:sp>
+      <p:cxnSp>
+        <p:nvCxnSpPr>
+          <p:cNvPr id="20" name="구부러진 연결선 19"/>
+          <p:cNvCxnSpPr>
+            <a:stCxn id="7" idx="0"/>
+            <a:endCxn id="11" idx="0"/>
+          </p:cNvCxnSpPr>
+          <p:nvPr/>
+        </p:nvCxnSpPr>
+        <p:spPr>
+          <a:xfrm rot="5400000" flipH="1" flipV="1">
+            <a:off x="1688736" y="216118"/>
+            <a:ext cx="12700" cy="2393317"/>
+          </a:xfrm>
+          <a:prstGeom prst="curvedConnector3">
+            <a:avLst>
+              <a:gd name="adj1" fmla="val 1800000"/>
+            </a:avLst>
+          </a:prstGeom>
+          <a:ln>
+            <a:tailEnd type="arrow"/>
+          </a:ln>
+        </p:spPr>
+        <p:style>
+          <a:lnRef idx="1">
+            <a:schemeClr val="accent1"/>
+          </a:lnRef>
+          <a:fillRef idx="0">
+            <a:schemeClr val="accent1"/>
+          </a:fillRef>
+          <a:effectRef idx="0">
+            <a:schemeClr val="accent1"/>
+          </a:effectRef>
+          <a:fontRef idx="minor">
+            <a:schemeClr val="tx1"/>
+          </a:fontRef>
+        </p:style>
+      </p:cxnSp>
+      <p:cxnSp>
+        <p:nvCxnSpPr>
+          <p:cNvPr id="23" name="구부러진 연결선 22"/>
+          <p:cNvCxnSpPr>
+            <a:stCxn id="8" idx="0"/>
+            <a:endCxn id="11" idx="0"/>
+          </p:cNvCxnSpPr>
+          <p:nvPr/>
+        </p:nvCxnSpPr>
+        <p:spPr>
+          <a:xfrm rot="5400000" flipH="1" flipV="1">
+            <a:off x="2216381" y="743763"/>
+            <a:ext cx="12700" cy="1338027"/>
+          </a:xfrm>
+          <a:prstGeom prst="curvedConnector3">
+            <a:avLst>
+              <a:gd name="adj1" fmla="val 1800000"/>
+            </a:avLst>
+          </a:prstGeom>
+          <a:ln>
+            <a:tailEnd type="arrow"/>
+          </a:ln>
+        </p:spPr>
+        <p:style>
+          <a:lnRef idx="1">
+            <a:schemeClr val="accent1"/>
+          </a:lnRef>
+          <a:fillRef idx="0">
+            <a:schemeClr val="accent1"/>
+          </a:fillRef>
+          <a:effectRef idx="0">
+            <a:schemeClr val="accent1"/>
+          </a:effectRef>
+          <a:fontRef idx="minor">
+            <a:schemeClr val="tx1"/>
+          </a:fontRef>
+        </p:style>
+      </p:cxnSp>
+      <p:cxnSp>
+        <p:nvCxnSpPr>
+          <p:cNvPr id="25" name="구부러진 연결선 24"/>
+          <p:cNvCxnSpPr>
+            <a:stCxn id="12" idx="2"/>
+            <a:endCxn id="6" idx="2"/>
+          </p:cNvCxnSpPr>
+          <p:nvPr/>
+        </p:nvCxnSpPr>
+        <p:spPr>
+          <a:xfrm rot="5400000">
+            <a:off x="1688737" y="1103803"/>
+            <a:ext cx="12700" cy="1338027"/>
+          </a:xfrm>
+          <a:prstGeom prst="curvedConnector3">
+            <a:avLst>
+              <a:gd name="adj1" fmla="val 1800000"/>
+            </a:avLst>
+          </a:prstGeom>
+          <a:ln>
+            <a:tailEnd type="arrow"/>
+          </a:ln>
+        </p:spPr>
+        <p:style>
+          <a:lnRef idx="1">
+            <a:schemeClr val="accent1"/>
+          </a:lnRef>
+          <a:fillRef idx="0">
+            <a:schemeClr val="accent1"/>
+          </a:fillRef>
+          <a:effectRef idx="0">
+            <a:schemeClr val="accent1"/>
+          </a:effectRef>
+          <a:fontRef idx="minor">
+            <a:schemeClr val="tx1"/>
+          </a:fontRef>
+        </p:style>
+      </p:cxnSp>
+      <p:cxnSp>
+        <p:nvCxnSpPr>
+          <p:cNvPr id="27" name="구부러진 연결선 26"/>
+          <p:cNvCxnSpPr>
+            <a:stCxn id="13" idx="2"/>
+            <a:endCxn id="6" idx="2"/>
+          </p:cNvCxnSpPr>
+          <p:nvPr/>
+        </p:nvCxnSpPr>
+        <p:spPr>
+          <a:xfrm rot="5400000">
+            <a:off x="2216382" y="576158"/>
+            <a:ext cx="12700" cy="2393317"/>
+          </a:xfrm>
+          <a:prstGeom prst="curvedConnector3">
+            <a:avLst>
+              <a:gd name="adj1" fmla="val 1800000"/>
+            </a:avLst>
+          </a:prstGeom>
+          <a:ln>
+            <a:tailEnd type="arrow"/>
+          </a:ln>
+        </p:spPr>
+        <p:style>
+          <a:lnRef idx="1">
+            <a:schemeClr val="accent1"/>
+          </a:lnRef>
+          <a:fillRef idx="0">
+            <a:schemeClr val="accent1"/>
+          </a:fillRef>
+          <a:effectRef idx="0">
+            <a:schemeClr val="accent1"/>
+          </a:effectRef>
+          <a:fontRef idx="minor">
+            <a:schemeClr val="tx1"/>
+          </a:fontRef>
+        </p:style>
+      </p:cxnSp>
+      <p:grpSp>
+        <p:nvGrpSpPr>
+          <p:cNvPr id="31" name="그룹 30"/>
+          <p:cNvGrpSpPr/>
+          <p:nvPr/>
+        </p:nvGrpSpPr>
+        <p:grpSpPr>
+          <a:xfrm>
+            <a:off x="414005" y="2486544"/>
+            <a:ext cx="1224136" cy="360040"/>
+            <a:chOff x="971600" y="1268760"/>
+            <a:chExt cx="2088232" cy="576064"/>
+          </a:xfrm>
+        </p:grpSpPr>
+        <p:sp>
+          <p:nvSpPr>
+            <p:cNvPr id="32" name="모서리가 둥근 직사각형 31"/>
+            <p:cNvSpPr/>
+            <p:nvPr/>
+          </p:nvSpPr>
+          <p:spPr>
+            <a:xfrm>
+              <a:off x="971600" y="1268760"/>
+              <a:ext cx="2088232" cy="576064"/>
+            </a:xfrm>
+            <a:prstGeom prst="roundRect">
+              <a:avLst/>
+            </a:prstGeom>
+          </p:spPr>
+          <p:style>
+            <a:lnRef idx="2">
+              <a:schemeClr val="dk1"/>
+            </a:lnRef>
+            <a:fillRef idx="1">
+              <a:schemeClr val="lt1"/>
+            </a:fillRef>
+            <a:effectRef idx="0">
+              <a:schemeClr val="dk1"/>
+            </a:effectRef>
+            <a:fontRef idx="minor">
+              <a:schemeClr val="dk1"/>
+            </a:fontRef>
+          </p:style>
+          <p:txBody>
+            <a:bodyPr rtlCol="0" anchor="ctr"/>
+            <a:lstStyle/>
+            <a:p>
+              <a:pPr algn="ctr"/>
+              <a:r>
+                <a:rPr lang="en-US" altLang="ko-KR" dirty="0" smtClean="0"/>
+                <a:t>head</a:t>
+              </a:r>
+              <a:endParaRPr lang="ko-KR" altLang="en-US" dirty="0"/>
+            </a:p>
+          </p:txBody>
+        </p:sp>
+        <p:sp>
+          <p:nvSpPr>
+            <p:cNvPr id="33" name="모서리가 둥근 직사각형 32"/>
+            <p:cNvSpPr/>
+            <p:nvPr/>
+          </p:nvSpPr>
+          <p:spPr>
+            <a:xfrm>
+              <a:off x="971600" y="1268760"/>
+              <a:ext cx="288032" cy="576064"/>
+            </a:xfrm>
+            <a:prstGeom prst="roundRect">
+              <a:avLst/>
+            </a:prstGeom>
+          </p:spPr>
+          <p:style>
+            <a:lnRef idx="2">
+              <a:schemeClr val="dk1"/>
+            </a:lnRef>
+            <a:fillRef idx="1">
+              <a:schemeClr val="lt1"/>
+            </a:fillRef>
+            <a:effectRef idx="0">
+              <a:schemeClr val="dk1"/>
+            </a:effectRef>
+            <a:fontRef idx="minor">
+              <a:schemeClr val="dk1"/>
+            </a:fontRef>
+          </p:style>
+          <p:txBody>
+            <a:bodyPr rtlCol="0" anchor="ctr"/>
+            <a:lstStyle/>
+            <a:p>
+              <a:pPr algn="ctr"/>
+              <a:endParaRPr lang="ko-KR" altLang="en-US"/>
+            </a:p>
+          </p:txBody>
+        </p:sp>
+        <p:sp>
+          <p:nvSpPr>
+            <p:cNvPr id="34" name="모서리가 둥근 직사각형 33"/>
+            <p:cNvSpPr/>
+            <p:nvPr/>
+          </p:nvSpPr>
+          <p:spPr>
+            <a:xfrm>
+              <a:off x="2771800" y="1268760"/>
+              <a:ext cx="288032" cy="576064"/>
+            </a:xfrm>
+            <a:prstGeom prst="roundRect">
+              <a:avLst/>
+            </a:prstGeom>
+          </p:spPr>
+          <p:style>
+            <a:lnRef idx="2">
+              <a:schemeClr val="dk1"/>
+            </a:lnRef>
+            <a:fillRef idx="1">
+              <a:schemeClr val="lt1"/>
+            </a:fillRef>
+            <a:effectRef idx="0">
+              <a:schemeClr val="dk1"/>
+            </a:effectRef>
+            <a:fontRef idx="minor">
+              <a:schemeClr val="dk1"/>
+            </a:fontRef>
+          </p:style>
+          <p:txBody>
+            <a:bodyPr rtlCol="0" anchor="ctr"/>
+            <a:lstStyle/>
+            <a:p>
+              <a:pPr algn="ctr"/>
+              <a:endParaRPr lang="ko-KR" altLang="en-US"/>
+            </a:p>
+          </p:txBody>
+        </p:sp>
+      </p:grpSp>
+      <p:grpSp>
+        <p:nvGrpSpPr>
+          <p:cNvPr id="35" name="그룹 34"/>
+          <p:cNvGrpSpPr/>
+          <p:nvPr/>
+        </p:nvGrpSpPr>
+        <p:grpSpPr>
+          <a:xfrm>
+            <a:off x="2279677" y="2486544"/>
+            <a:ext cx="1224136" cy="360040"/>
+            <a:chOff x="971600" y="1268760"/>
+            <a:chExt cx="2088232" cy="576064"/>
+          </a:xfrm>
+        </p:grpSpPr>
+        <p:sp>
+          <p:nvSpPr>
+            <p:cNvPr id="36" name="모서리가 둥근 직사각형 35"/>
+            <p:cNvSpPr/>
+            <p:nvPr/>
+          </p:nvSpPr>
+          <p:spPr>
+            <a:xfrm>
+              <a:off x="971600" y="1268760"/>
+              <a:ext cx="2088232" cy="576064"/>
+            </a:xfrm>
+            <a:prstGeom prst="roundRect">
+              <a:avLst/>
+            </a:prstGeom>
+          </p:spPr>
+          <p:style>
+            <a:lnRef idx="2">
+              <a:schemeClr val="dk1"/>
+            </a:lnRef>
+            <a:fillRef idx="1">
+              <a:schemeClr val="lt1"/>
+            </a:fillRef>
+            <a:effectRef idx="0">
+              <a:schemeClr val="dk1"/>
+            </a:effectRef>
+            <a:fontRef idx="minor">
+              <a:schemeClr val="dk1"/>
+            </a:fontRef>
+          </p:style>
+          <p:txBody>
+            <a:bodyPr rtlCol="0" anchor="ctr"/>
+            <a:lstStyle/>
+            <a:p>
+              <a:pPr algn="ctr"/>
+              <a:r>
+                <a:rPr lang="en-US" altLang="ko-KR" dirty="0" smtClean="0"/>
+                <a:t>1</a:t>
+              </a:r>
+              <a:endParaRPr lang="ko-KR" altLang="en-US" dirty="0"/>
+            </a:p>
+          </p:txBody>
+        </p:sp>
+        <p:sp>
+          <p:nvSpPr>
+            <p:cNvPr id="37" name="모서리가 둥근 직사각형 36"/>
+            <p:cNvSpPr/>
+            <p:nvPr/>
+          </p:nvSpPr>
+          <p:spPr>
+            <a:xfrm>
+              <a:off x="971600" y="1268760"/>
+              <a:ext cx="288032" cy="576064"/>
+            </a:xfrm>
+            <a:prstGeom prst="roundRect">
+              <a:avLst/>
+            </a:prstGeom>
+          </p:spPr>
+          <p:style>
+            <a:lnRef idx="2">
+              <a:schemeClr val="dk1"/>
+            </a:lnRef>
+            <a:fillRef idx="1">
+              <a:schemeClr val="lt1"/>
+            </a:fillRef>
+            <a:effectRef idx="0">
+              <a:schemeClr val="dk1"/>
+            </a:effectRef>
+            <a:fontRef idx="minor">
+              <a:schemeClr val="dk1"/>
+            </a:fontRef>
+          </p:style>
+          <p:txBody>
+            <a:bodyPr rtlCol="0" anchor="ctr"/>
+            <a:lstStyle/>
+            <a:p>
+              <a:pPr algn="ctr"/>
+              <a:endParaRPr lang="ko-KR" altLang="en-US"/>
+            </a:p>
+          </p:txBody>
+        </p:sp>
+        <p:sp>
+          <p:nvSpPr>
+            <p:cNvPr id="38" name="모서리가 둥근 직사각형 37"/>
+            <p:cNvSpPr/>
+            <p:nvPr/>
+          </p:nvSpPr>
+          <p:spPr>
+            <a:xfrm>
+              <a:off x="2771800" y="1268760"/>
+              <a:ext cx="288032" cy="576064"/>
+            </a:xfrm>
+            <a:prstGeom prst="roundRect">
+              <a:avLst/>
+            </a:prstGeom>
+          </p:spPr>
+          <p:style>
+            <a:lnRef idx="2">
+              <a:schemeClr val="dk1"/>
+            </a:lnRef>
+            <a:fillRef idx="1">
+              <a:schemeClr val="lt1"/>
+            </a:fillRef>
+            <a:effectRef idx="0">
+              <a:schemeClr val="dk1"/>
+            </a:effectRef>
+            <a:fontRef idx="minor">
+              <a:schemeClr val="dk1"/>
+            </a:fontRef>
+          </p:style>
+          <p:txBody>
+            <a:bodyPr rtlCol="0" anchor="ctr"/>
+            <a:lstStyle/>
+            <a:p>
+              <a:pPr algn="ctr"/>
+              <a:endParaRPr lang="ko-KR" altLang="en-US"/>
+            </a:p>
+          </p:txBody>
+        </p:sp>
+      </p:grpSp>
+      <p:cxnSp>
+        <p:nvCxnSpPr>
+          <p:cNvPr id="39" name="구부러진 연결선 38"/>
+          <p:cNvCxnSpPr>
+            <a:stCxn id="33" idx="0"/>
+            <a:endCxn id="44" idx="0"/>
+          </p:cNvCxnSpPr>
+          <p:nvPr/>
+        </p:nvCxnSpPr>
+        <p:spPr>
+          <a:xfrm rot="16200000" flipH="1">
+            <a:off x="2478032" y="506939"/>
+            <a:ext cx="6351" cy="3965560"/>
+          </a:xfrm>
+          <a:prstGeom prst="curvedConnector3">
+            <a:avLst>
+              <a:gd name="adj1" fmla="val -3599433"/>
+            </a:avLst>
+          </a:prstGeom>
+          <a:ln>
+            <a:tailEnd type="arrow"/>
+          </a:ln>
+        </p:spPr>
+        <p:style>
+          <a:lnRef idx="1">
+            <a:schemeClr val="accent1"/>
+          </a:lnRef>
+          <a:fillRef idx="0">
+            <a:schemeClr val="accent1"/>
+          </a:fillRef>
+          <a:effectRef idx="0">
+            <a:schemeClr val="accent1"/>
+          </a:effectRef>
+          <a:fontRef idx="minor">
+            <a:schemeClr val="tx1"/>
+          </a:fontRef>
+        </p:style>
+      </p:cxnSp>
+      <p:cxnSp>
+        <p:nvCxnSpPr>
+          <p:cNvPr id="40" name="구부러진 연결선 39"/>
+          <p:cNvCxnSpPr>
+            <a:stCxn id="34" idx="0"/>
+            <a:endCxn id="36" idx="0"/>
+          </p:cNvCxnSpPr>
+          <p:nvPr/>
+        </p:nvCxnSpPr>
+        <p:spPr>
+          <a:xfrm rot="5400000" flipH="1" flipV="1">
+            <a:off x="2222731" y="1817531"/>
+            <a:ext cx="12700" cy="1338027"/>
+          </a:xfrm>
+          <a:prstGeom prst="curvedConnector3">
+            <a:avLst>
+              <a:gd name="adj1" fmla="val 1800000"/>
+            </a:avLst>
+          </a:prstGeom>
+          <a:ln>
+            <a:tailEnd type="arrow"/>
+          </a:ln>
+        </p:spPr>
+        <p:style>
+          <a:lnRef idx="1">
+            <a:schemeClr val="accent1"/>
+          </a:lnRef>
+          <a:fillRef idx="0">
+            <a:schemeClr val="accent1"/>
+          </a:fillRef>
+          <a:effectRef idx="0">
+            <a:schemeClr val="accent1"/>
+          </a:effectRef>
+          <a:fontRef idx="minor">
+            <a:schemeClr val="tx1"/>
+          </a:fontRef>
+        </p:style>
+      </p:cxnSp>
+      <p:cxnSp>
+        <p:nvCxnSpPr>
+          <p:cNvPr id="41" name="구부러진 연결선 40"/>
+          <p:cNvCxnSpPr>
+            <a:stCxn id="37" idx="2"/>
+            <a:endCxn id="32" idx="2"/>
+          </p:cNvCxnSpPr>
+          <p:nvPr/>
+        </p:nvCxnSpPr>
+        <p:spPr>
+          <a:xfrm rot="5400000">
+            <a:off x="1695087" y="2177571"/>
+            <a:ext cx="12700" cy="1338027"/>
+          </a:xfrm>
+          <a:prstGeom prst="curvedConnector3">
+            <a:avLst>
+              <a:gd name="adj1" fmla="val 1800000"/>
+            </a:avLst>
+          </a:prstGeom>
+          <a:ln>
+            <a:tailEnd type="arrow"/>
+          </a:ln>
+        </p:spPr>
+        <p:style>
+          <a:lnRef idx="1">
+            <a:schemeClr val="accent1"/>
+          </a:lnRef>
+          <a:fillRef idx="0">
+            <a:schemeClr val="accent1"/>
+          </a:fillRef>
+          <a:effectRef idx="0">
+            <a:schemeClr val="accent1"/>
+          </a:effectRef>
+          <a:fontRef idx="minor">
+            <a:schemeClr val="tx1"/>
+          </a:fontRef>
+        </p:style>
+      </p:cxnSp>
+      <p:cxnSp>
+        <p:nvCxnSpPr>
+          <p:cNvPr id="42" name="구부러진 연결선 41"/>
+          <p:cNvCxnSpPr>
+            <a:stCxn id="46" idx="2"/>
+            <a:endCxn id="32" idx="2"/>
+          </p:cNvCxnSpPr>
+          <p:nvPr/>
+        </p:nvCxnSpPr>
+        <p:spPr>
+          <a:xfrm rot="5400000" flipH="1">
+            <a:off x="3005677" y="866980"/>
+            <a:ext cx="6351" cy="3965560"/>
+          </a:xfrm>
+          <a:prstGeom prst="curvedConnector3">
+            <a:avLst>
+              <a:gd name="adj1" fmla="val -3599433"/>
+            </a:avLst>
+          </a:prstGeom>
+          <a:ln>
+            <a:tailEnd type="arrow"/>
+          </a:ln>
+        </p:spPr>
+        <p:style>
+          <a:lnRef idx="1">
+            <a:schemeClr val="accent1"/>
+          </a:lnRef>
+          <a:fillRef idx="0">
+            <a:schemeClr val="accent1"/>
+          </a:fillRef>
+          <a:effectRef idx="0">
+            <a:schemeClr val="accent1"/>
+          </a:effectRef>
+          <a:fontRef idx="minor">
+            <a:schemeClr val="tx1"/>
+          </a:fontRef>
+        </p:style>
+      </p:cxnSp>
+      <p:grpSp>
+        <p:nvGrpSpPr>
+          <p:cNvPr id="43" name="그룹 42"/>
+          <p:cNvGrpSpPr/>
+          <p:nvPr/>
+        </p:nvGrpSpPr>
+        <p:grpSpPr>
+          <a:xfrm>
+            <a:off x="3851920" y="2492895"/>
+            <a:ext cx="1224136" cy="360040"/>
+            <a:chOff x="971600" y="1268760"/>
+            <a:chExt cx="2088232" cy="576064"/>
+          </a:xfrm>
+        </p:grpSpPr>
+        <p:sp>
+          <p:nvSpPr>
+            <p:cNvPr id="44" name="모서리가 둥근 직사각형 43"/>
+            <p:cNvSpPr/>
+            <p:nvPr/>
+          </p:nvSpPr>
+          <p:spPr>
+            <a:xfrm>
+              <a:off x="971600" y="1268760"/>
+              <a:ext cx="2088232" cy="576064"/>
+            </a:xfrm>
+            <a:prstGeom prst="roundRect">
+              <a:avLst/>
+            </a:prstGeom>
+          </p:spPr>
+          <p:style>
+            <a:lnRef idx="2">
+              <a:schemeClr val="dk1"/>
+            </a:lnRef>
+            <a:fillRef idx="1">
+              <a:schemeClr val="lt1"/>
+            </a:fillRef>
+            <a:effectRef idx="0">
+              <a:schemeClr val="dk1"/>
+            </a:effectRef>
+            <a:fontRef idx="minor">
+              <a:schemeClr val="dk1"/>
+            </a:fontRef>
+          </p:style>
+          <p:txBody>
+            <a:bodyPr rtlCol="0" anchor="ctr"/>
+            <a:lstStyle/>
+            <a:p>
+              <a:pPr algn="ctr"/>
+              <a:r>
+                <a:rPr lang="en-US" altLang="ko-KR" dirty="0" smtClean="0"/>
+                <a:t>0</a:t>
+              </a:r>
+              <a:endParaRPr lang="ko-KR" altLang="en-US" dirty="0"/>
+            </a:p>
+          </p:txBody>
+        </p:sp>
+        <p:sp>
+          <p:nvSpPr>
+            <p:cNvPr id="45" name="모서리가 둥근 직사각형 44"/>
+            <p:cNvSpPr/>
+            <p:nvPr/>
+          </p:nvSpPr>
+          <p:spPr>
+            <a:xfrm>
+              <a:off x="971600" y="1268760"/>
+              <a:ext cx="288032" cy="576064"/>
+            </a:xfrm>
+            <a:prstGeom prst="roundRect">
+              <a:avLst/>
+            </a:prstGeom>
+          </p:spPr>
+          <p:style>
+            <a:lnRef idx="2">
+              <a:schemeClr val="dk1"/>
+            </a:lnRef>
+            <a:fillRef idx="1">
+              <a:schemeClr val="lt1"/>
+            </a:fillRef>
+            <a:effectRef idx="0">
+              <a:schemeClr val="dk1"/>
+            </a:effectRef>
+            <a:fontRef idx="minor">
+              <a:schemeClr val="dk1"/>
+            </a:fontRef>
+          </p:style>
+          <p:txBody>
+            <a:bodyPr rtlCol="0" anchor="ctr"/>
+            <a:lstStyle/>
+            <a:p>
+              <a:pPr algn="ctr"/>
+              <a:endParaRPr lang="ko-KR" altLang="en-US"/>
+            </a:p>
+          </p:txBody>
+        </p:sp>
+        <p:sp>
+          <p:nvSpPr>
+            <p:cNvPr id="46" name="모서리가 둥근 직사각형 45"/>
+            <p:cNvSpPr/>
+            <p:nvPr/>
+          </p:nvSpPr>
+          <p:spPr>
+            <a:xfrm>
+              <a:off x="2771800" y="1268760"/>
+              <a:ext cx="288032" cy="576064"/>
+            </a:xfrm>
+            <a:prstGeom prst="roundRect">
+              <a:avLst/>
+            </a:prstGeom>
+          </p:spPr>
+          <p:style>
+            <a:lnRef idx="2">
+              <a:schemeClr val="dk1"/>
+            </a:lnRef>
+            <a:fillRef idx="1">
+              <a:schemeClr val="lt1"/>
+            </a:fillRef>
+            <a:effectRef idx="0">
+              <a:schemeClr val="dk1"/>
+            </a:effectRef>
+            <a:fontRef idx="minor">
+              <a:schemeClr val="dk1"/>
+            </a:fontRef>
+          </p:style>
+          <p:txBody>
+            <a:bodyPr rtlCol="0" anchor="ctr"/>
+            <a:lstStyle/>
+            <a:p>
+              <a:pPr algn="ctr"/>
+              <a:endParaRPr lang="ko-KR" altLang="en-US"/>
+            </a:p>
+          </p:txBody>
+        </p:sp>
+      </p:grpSp>
+      <p:cxnSp>
+        <p:nvCxnSpPr>
+          <p:cNvPr id="50" name="구부러진 연결선 49"/>
+          <p:cNvCxnSpPr>
+            <a:stCxn id="45" idx="2"/>
+            <a:endCxn id="36" idx="2"/>
+          </p:cNvCxnSpPr>
+          <p:nvPr/>
+        </p:nvCxnSpPr>
+        <p:spPr>
+          <a:xfrm rot="5400000" flipH="1">
+            <a:off x="3410868" y="2327461"/>
+            <a:ext cx="6351" cy="1044598"/>
+          </a:xfrm>
+          <a:prstGeom prst="curvedConnector3">
+            <a:avLst>
+              <a:gd name="adj1" fmla="val -3599433"/>
+            </a:avLst>
+          </a:prstGeom>
+          <a:ln>
+            <a:tailEnd type="arrow"/>
+          </a:ln>
+        </p:spPr>
+        <p:style>
+          <a:lnRef idx="1">
+            <a:schemeClr val="accent1"/>
+          </a:lnRef>
+          <a:fillRef idx="0">
+            <a:schemeClr val="accent1"/>
+          </a:fillRef>
+          <a:effectRef idx="0">
+            <a:schemeClr val="accent1"/>
+          </a:effectRef>
+          <a:fontRef idx="minor">
+            <a:schemeClr val="tx1"/>
+          </a:fontRef>
+        </p:style>
+      </p:cxnSp>
+      <p:cxnSp>
+        <p:nvCxnSpPr>
+          <p:cNvPr id="52" name="구부러진 연결선 51"/>
+          <p:cNvCxnSpPr>
+            <a:stCxn id="38" idx="0"/>
+            <a:endCxn id="44" idx="0"/>
+          </p:cNvCxnSpPr>
+          <p:nvPr/>
+        </p:nvCxnSpPr>
+        <p:spPr>
+          <a:xfrm rot="16200000" flipH="1">
+            <a:off x="3938513" y="1967420"/>
+            <a:ext cx="6351" cy="1044598"/>
+          </a:xfrm>
+          <a:prstGeom prst="curvedConnector3">
+            <a:avLst>
+              <a:gd name="adj1" fmla="val -3599433"/>
+            </a:avLst>
+          </a:prstGeom>
+          <a:ln>
+            <a:tailEnd type="arrow"/>
+          </a:ln>
+        </p:spPr>
+        <p:style>
+          <a:lnRef idx="1">
+            <a:schemeClr val="accent1"/>
+          </a:lnRef>
+          <a:fillRef idx="0">
+            <a:schemeClr val="accent1"/>
+          </a:fillRef>
+          <a:effectRef idx="0">
+            <a:schemeClr val="accent1"/>
+          </a:effectRef>
+          <a:fontRef idx="minor">
+            <a:schemeClr val="tx1"/>
+          </a:fontRef>
+        </p:style>
+      </p:cxnSp>
+      <p:sp>
+        <p:nvSpPr>
+          <p:cNvPr id="53" name="TextBox 52"/>
+          <p:cNvSpPr txBox="1"/>
+          <p:nvPr/>
+        </p:nvSpPr>
+        <p:spPr>
+          <a:xfrm>
+            <a:off x="407655" y="3501008"/>
+            <a:ext cx="2381560" cy="369332"/>
+          </a:xfrm>
+          <a:prstGeom prst="rect">
+            <a:avLst/>
+          </a:prstGeom>
+          <a:noFill/>
+        </p:spPr>
+        <p:txBody>
+          <a:bodyPr wrap="square" rtlCol="0">
+            <a:spAutoFit/>
+          </a:bodyPr>
+          <a:lstStyle/>
+          <a:p>
+            <a:r>
+              <a:rPr lang="en-US" altLang="ko-KR" b="1" dirty="0" err="1" smtClean="0"/>
+              <a:t>List_add_tail</a:t>
+            </a:r>
+            <a:r>
+              <a:rPr lang="en-US" altLang="ko-KR" b="1" dirty="0" smtClean="0"/>
+              <a:t>()</a:t>
+            </a:r>
+            <a:endParaRPr lang="ko-KR" altLang="en-US" b="1" dirty="0"/>
+          </a:p>
+        </p:txBody>
+      </p:sp>
+      <p:grpSp>
+        <p:nvGrpSpPr>
+          <p:cNvPr id="54" name="그룹 53"/>
+          <p:cNvGrpSpPr/>
+          <p:nvPr/>
+        </p:nvGrpSpPr>
+        <p:grpSpPr>
+          <a:xfrm>
+            <a:off x="2207208" y="4589663"/>
+            <a:ext cx="1224136" cy="360040"/>
+            <a:chOff x="971600" y="1268760"/>
+            <a:chExt cx="2088232" cy="576064"/>
+          </a:xfrm>
+        </p:grpSpPr>
+        <p:sp>
+          <p:nvSpPr>
+            <p:cNvPr id="55" name="모서리가 둥근 직사각형 54"/>
+            <p:cNvSpPr/>
+            <p:nvPr/>
+          </p:nvSpPr>
+          <p:spPr>
+            <a:xfrm>
+              <a:off x="971600" y="1268760"/>
+              <a:ext cx="2088232" cy="576064"/>
+            </a:xfrm>
+            <a:prstGeom prst="roundRect">
+              <a:avLst/>
+            </a:prstGeom>
+          </p:spPr>
+          <p:style>
+            <a:lnRef idx="2">
+              <a:schemeClr val="dk1"/>
+            </a:lnRef>
+            <a:fillRef idx="1">
+              <a:schemeClr val="lt1"/>
+            </a:fillRef>
+            <a:effectRef idx="0">
+              <a:schemeClr val="dk1"/>
+            </a:effectRef>
+            <a:fontRef idx="minor">
+              <a:schemeClr val="dk1"/>
+            </a:fontRef>
+          </p:style>
+          <p:txBody>
+            <a:bodyPr rtlCol="0" anchor="ctr"/>
+            <a:lstStyle/>
+            <a:p>
+              <a:pPr algn="ctr"/>
+              <a:r>
+                <a:rPr lang="en-US" altLang="ko-KR" dirty="0"/>
+                <a:t>0</a:t>
+              </a:r>
+              <a:endParaRPr lang="ko-KR" altLang="en-US" dirty="0"/>
+            </a:p>
+          </p:txBody>
+        </p:sp>
+        <p:sp>
+          <p:nvSpPr>
+            <p:cNvPr id="56" name="모서리가 둥근 직사각형 55"/>
+            <p:cNvSpPr/>
+            <p:nvPr/>
+          </p:nvSpPr>
+          <p:spPr>
+            <a:xfrm>
+              <a:off x="971600" y="1268760"/>
+              <a:ext cx="288032" cy="576064"/>
+            </a:xfrm>
+            <a:prstGeom prst="roundRect">
+              <a:avLst/>
+            </a:prstGeom>
+          </p:spPr>
+          <p:style>
+            <a:lnRef idx="2">
+              <a:schemeClr val="dk1"/>
+            </a:lnRef>
+            <a:fillRef idx="1">
+              <a:schemeClr val="lt1"/>
+            </a:fillRef>
+            <a:effectRef idx="0">
+              <a:schemeClr val="dk1"/>
+            </a:effectRef>
+            <a:fontRef idx="minor">
+              <a:schemeClr val="dk1"/>
+            </a:fontRef>
+          </p:style>
+          <p:txBody>
+            <a:bodyPr rtlCol="0" anchor="ctr"/>
+            <a:lstStyle/>
+            <a:p>
+              <a:pPr algn="ctr"/>
+              <a:endParaRPr lang="ko-KR" altLang="en-US"/>
+            </a:p>
+          </p:txBody>
+        </p:sp>
+        <p:sp>
+          <p:nvSpPr>
+            <p:cNvPr id="57" name="모서리가 둥근 직사각형 56"/>
+            <p:cNvSpPr/>
+            <p:nvPr/>
+          </p:nvSpPr>
+          <p:spPr>
+            <a:xfrm>
+              <a:off x="2771800" y="1268760"/>
+              <a:ext cx="288032" cy="576064"/>
+            </a:xfrm>
+            <a:prstGeom prst="roundRect">
+              <a:avLst/>
+            </a:prstGeom>
+          </p:spPr>
+          <p:style>
+            <a:lnRef idx="2">
+              <a:schemeClr val="dk1"/>
+            </a:lnRef>
+            <a:fillRef idx="1">
+              <a:schemeClr val="lt1"/>
+            </a:fillRef>
+            <a:effectRef idx="0">
+              <a:schemeClr val="dk1"/>
+            </a:effectRef>
+            <a:fontRef idx="minor">
+              <a:schemeClr val="dk1"/>
+            </a:fontRef>
+          </p:style>
+          <p:txBody>
+            <a:bodyPr rtlCol="0" anchor="ctr"/>
+            <a:lstStyle/>
+            <a:p>
+              <a:pPr algn="ctr"/>
+              <a:endParaRPr lang="ko-KR" altLang="en-US"/>
+            </a:p>
+          </p:txBody>
+        </p:sp>
+      </p:grpSp>
+      <p:grpSp>
+        <p:nvGrpSpPr>
+          <p:cNvPr id="58" name="그룹 57"/>
+          <p:cNvGrpSpPr/>
+          <p:nvPr/>
+        </p:nvGrpSpPr>
+        <p:grpSpPr>
+          <a:xfrm>
+            <a:off x="4072880" y="4589663"/>
+            <a:ext cx="1224136" cy="360040"/>
+            <a:chOff x="971600" y="1268760"/>
+            <a:chExt cx="2088232" cy="576064"/>
+          </a:xfrm>
+        </p:grpSpPr>
+        <p:sp>
+          <p:nvSpPr>
+            <p:cNvPr id="59" name="모서리가 둥근 직사각형 58"/>
+            <p:cNvSpPr/>
+            <p:nvPr/>
+          </p:nvSpPr>
+          <p:spPr>
+            <a:xfrm>
+              <a:off x="971600" y="1268760"/>
+              <a:ext cx="2088232" cy="576064"/>
+            </a:xfrm>
+            <a:prstGeom prst="roundRect">
+              <a:avLst/>
+            </a:prstGeom>
+          </p:spPr>
+          <p:style>
+            <a:lnRef idx="2">
+              <a:schemeClr val="dk1"/>
+            </a:lnRef>
+            <a:fillRef idx="1">
+              <a:schemeClr val="lt1"/>
+            </a:fillRef>
+            <a:effectRef idx="0">
+              <a:schemeClr val="dk1"/>
+            </a:effectRef>
+            <a:fontRef idx="minor">
+              <a:schemeClr val="dk1"/>
+            </a:fontRef>
+          </p:style>
+          <p:txBody>
+            <a:bodyPr rtlCol="0" anchor="ctr"/>
+            <a:lstStyle/>
+            <a:p>
+              <a:pPr algn="ctr"/>
+              <a:r>
+                <a:rPr lang="en-US" altLang="ko-KR" dirty="0" smtClean="0"/>
+                <a:t>head</a:t>
+              </a:r>
+              <a:endParaRPr lang="ko-KR" altLang="en-US" dirty="0"/>
+            </a:p>
+          </p:txBody>
+        </p:sp>
+        <p:sp>
+          <p:nvSpPr>
+            <p:cNvPr id="60" name="모서리가 둥근 직사각형 59"/>
+            <p:cNvSpPr/>
+            <p:nvPr/>
+          </p:nvSpPr>
+          <p:spPr>
+            <a:xfrm>
+              <a:off x="971600" y="1268760"/>
+              <a:ext cx="288032" cy="576064"/>
+            </a:xfrm>
+            <a:prstGeom prst="roundRect">
+              <a:avLst/>
+            </a:prstGeom>
+          </p:spPr>
+          <p:style>
+            <a:lnRef idx="2">
+              <a:schemeClr val="dk1"/>
+            </a:lnRef>
+            <a:fillRef idx="1">
+              <a:schemeClr val="lt1"/>
+            </a:fillRef>
+            <a:effectRef idx="0">
+              <a:schemeClr val="dk1"/>
+            </a:effectRef>
+            <a:fontRef idx="minor">
+              <a:schemeClr val="dk1"/>
+            </a:fontRef>
+          </p:style>
+          <p:txBody>
+            <a:bodyPr rtlCol="0" anchor="ctr"/>
+            <a:lstStyle/>
+            <a:p>
+              <a:pPr algn="ctr"/>
+              <a:endParaRPr lang="ko-KR" altLang="en-US"/>
+            </a:p>
+          </p:txBody>
+        </p:sp>
+        <p:sp>
+          <p:nvSpPr>
+            <p:cNvPr id="61" name="모서리가 둥근 직사각형 60"/>
+            <p:cNvSpPr/>
+            <p:nvPr/>
+          </p:nvSpPr>
+          <p:spPr>
+            <a:xfrm>
+              <a:off x="2771800" y="1268760"/>
+              <a:ext cx="288032" cy="576064"/>
+            </a:xfrm>
+            <a:prstGeom prst="roundRect">
+              <a:avLst/>
+            </a:prstGeom>
+          </p:spPr>
+          <p:style>
+            <a:lnRef idx="2">
+              <a:schemeClr val="dk1"/>
+            </a:lnRef>
+            <a:fillRef idx="1">
+              <a:schemeClr val="lt1"/>
+            </a:fillRef>
+            <a:effectRef idx="0">
+              <a:schemeClr val="dk1"/>
+            </a:effectRef>
+            <a:fontRef idx="minor">
+              <a:schemeClr val="dk1"/>
+            </a:fontRef>
+          </p:style>
+          <p:txBody>
+            <a:bodyPr rtlCol="0" anchor="ctr"/>
+            <a:lstStyle/>
+            <a:p>
+              <a:pPr algn="ctr"/>
+              <a:endParaRPr lang="ko-KR" altLang="en-US"/>
+            </a:p>
+          </p:txBody>
+        </p:sp>
+      </p:grpSp>
+      <p:cxnSp>
+        <p:nvCxnSpPr>
+          <p:cNvPr id="62" name="구부러진 연결선 61"/>
+          <p:cNvCxnSpPr>
+            <a:stCxn id="56" idx="0"/>
+            <a:endCxn id="59" idx="0"/>
+          </p:cNvCxnSpPr>
+          <p:nvPr/>
+        </p:nvCxnSpPr>
+        <p:spPr>
+          <a:xfrm rot="5400000" flipH="1" flipV="1">
+            <a:off x="3488289" y="3393005"/>
+            <a:ext cx="12700" cy="2393317"/>
+          </a:xfrm>
+          <a:prstGeom prst="curvedConnector3">
+            <a:avLst>
+              <a:gd name="adj1" fmla="val 1800000"/>
+            </a:avLst>
+          </a:prstGeom>
+          <a:ln>
+            <a:tailEnd type="arrow"/>
+          </a:ln>
+        </p:spPr>
+        <p:style>
+          <a:lnRef idx="1">
+            <a:schemeClr val="accent1"/>
+          </a:lnRef>
+          <a:fillRef idx="0">
+            <a:schemeClr val="accent1"/>
+          </a:fillRef>
+          <a:effectRef idx="0">
+            <a:schemeClr val="accent1"/>
+          </a:effectRef>
+          <a:fontRef idx="minor">
+            <a:schemeClr val="tx1"/>
+          </a:fontRef>
+        </p:style>
+      </p:cxnSp>
+      <p:cxnSp>
+        <p:nvCxnSpPr>
+          <p:cNvPr id="63" name="구부러진 연결선 62"/>
+          <p:cNvCxnSpPr>
+            <a:stCxn id="57" idx="0"/>
+            <a:endCxn id="59" idx="0"/>
+          </p:cNvCxnSpPr>
+          <p:nvPr/>
+        </p:nvCxnSpPr>
+        <p:spPr>
+          <a:xfrm rot="5400000" flipH="1" flipV="1">
+            <a:off x="4015934" y="3920650"/>
+            <a:ext cx="12700" cy="1338027"/>
+          </a:xfrm>
+          <a:prstGeom prst="curvedConnector3">
+            <a:avLst>
+              <a:gd name="adj1" fmla="val 1800000"/>
+            </a:avLst>
+          </a:prstGeom>
+          <a:ln>
+            <a:tailEnd type="arrow"/>
+          </a:ln>
+        </p:spPr>
+        <p:style>
+          <a:lnRef idx="1">
+            <a:schemeClr val="accent1"/>
+          </a:lnRef>
+          <a:fillRef idx="0">
+            <a:schemeClr val="accent1"/>
+          </a:fillRef>
+          <a:effectRef idx="0">
+            <a:schemeClr val="accent1"/>
+          </a:effectRef>
+          <a:fontRef idx="minor">
+            <a:schemeClr val="tx1"/>
+          </a:fontRef>
+        </p:style>
+      </p:cxnSp>
+      <p:cxnSp>
+        <p:nvCxnSpPr>
+          <p:cNvPr id="64" name="구부러진 연결선 63"/>
+          <p:cNvCxnSpPr>
+            <a:stCxn id="60" idx="2"/>
+            <a:endCxn id="55" idx="2"/>
+          </p:cNvCxnSpPr>
+          <p:nvPr/>
+        </p:nvCxnSpPr>
+        <p:spPr>
+          <a:xfrm rot="5400000">
+            <a:off x="3488290" y="4280690"/>
+            <a:ext cx="12700" cy="1338027"/>
+          </a:xfrm>
+          <a:prstGeom prst="curvedConnector3">
+            <a:avLst>
+              <a:gd name="adj1" fmla="val 1800000"/>
+            </a:avLst>
+          </a:prstGeom>
+          <a:ln>
+            <a:tailEnd type="arrow"/>
+          </a:ln>
+        </p:spPr>
+        <p:style>
+          <a:lnRef idx="1">
+            <a:schemeClr val="accent1"/>
+          </a:lnRef>
+          <a:fillRef idx="0">
+            <a:schemeClr val="accent1"/>
+          </a:fillRef>
+          <a:effectRef idx="0">
+            <a:schemeClr val="accent1"/>
+          </a:effectRef>
+          <a:fontRef idx="minor">
+            <a:schemeClr val="tx1"/>
+          </a:fontRef>
+        </p:style>
+      </p:cxnSp>
+      <p:cxnSp>
+        <p:nvCxnSpPr>
+          <p:cNvPr id="65" name="구부러진 연결선 64"/>
+          <p:cNvCxnSpPr>
+            <a:stCxn id="61" idx="2"/>
+            <a:endCxn id="55" idx="2"/>
+          </p:cNvCxnSpPr>
+          <p:nvPr/>
+        </p:nvCxnSpPr>
+        <p:spPr>
+          <a:xfrm rot="5400000">
+            <a:off x="4015935" y="3753045"/>
+            <a:ext cx="12700" cy="2393317"/>
+          </a:xfrm>
+          <a:prstGeom prst="curvedConnector3">
+            <a:avLst>
+              <a:gd name="adj1" fmla="val 1800000"/>
+            </a:avLst>
+          </a:prstGeom>
+          <a:ln>
+            <a:tailEnd type="arrow"/>
+          </a:ln>
+        </p:spPr>
+        <p:style>
+          <a:lnRef idx="1">
+            <a:schemeClr val="accent1"/>
+          </a:lnRef>
+          <a:fillRef idx="0">
+            <a:schemeClr val="accent1"/>
+          </a:fillRef>
+          <a:effectRef idx="0">
+            <a:schemeClr val="accent1"/>
+          </a:effectRef>
+          <a:fontRef idx="minor">
+            <a:schemeClr val="tx1"/>
+          </a:fontRef>
+        </p:style>
+      </p:cxnSp>
+      <p:grpSp>
+        <p:nvGrpSpPr>
+          <p:cNvPr id="66" name="그룹 65"/>
+          <p:cNvGrpSpPr/>
+          <p:nvPr/>
+        </p:nvGrpSpPr>
+        <p:grpSpPr>
+          <a:xfrm>
+            <a:off x="634965" y="5726904"/>
+            <a:ext cx="1224136" cy="360040"/>
+            <a:chOff x="971600" y="1268760"/>
+            <a:chExt cx="2088232" cy="576064"/>
+          </a:xfrm>
+        </p:grpSpPr>
+        <p:sp>
+          <p:nvSpPr>
+            <p:cNvPr id="67" name="모서리가 둥근 직사각형 66"/>
+            <p:cNvSpPr/>
+            <p:nvPr/>
+          </p:nvSpPr>
+          <p:spPr>
+            <a:xfrm>
+              <a:off x="971600" y="1268760"/>
+              <a:ext cx="2088232" cy="576064"/>
+            </a:xfrm>
+            <a:prstGeom prst="roundRect">
+              <a:avLst/>
+            </a:prstGeom>
+          </p:spPr>
+          <p:style>
+            <a:lnRef idx="2">
+              <a:schemeClr val="dk1"/>
+            </a:lnRef>
+            <a:fillRef idx="1">
+              <a:schemeClr val="lt1"/>
+            </a:fillRef>
+            <a:effectRef idx="0">
+              <a:schemeClr val="dk1"/>
+            </a:effectRef>
+            <a:fontRef idx="minor">
+              <a:schemeClr val="dk1"/>
+            </a:fontRef>
+          </p:style>
+          <p:txBody>
+            <a:bodyPr rtlCol="0" anchor="ctr"/>
+            <a:lstStyle/>
+            <a:p>
+              <a:pPr algn="ctr"/>
+              <a:r>
+                <a:rPr lang="en-US" altLang="ko-KR" dirty="0" smtClean="0"/>
+                <a:t>1</a:t>
+              </a:r>
+              <a:endParaRPr lang="ko-KR" altLang="en-US" dirty="0"/>
+            </a:p>
+          </p:txBody>
+        </p:sp>
+        <p:sp>
+          <p:nvSpPr>
+            <p:cNvPr id="68" name="모서리가 둥근 직사각형 67"/>
+            <p:cNvSpPr/>
+            <p:nvPr/>
+          </p:nvSpPr>
+          <p:spPr>
+            <a:xfrm>
+              <a:off x="971600" y="1268760"/>
+              <a:ext cx="288032" cy="576064"/>
+            </a:xfrm>
+            <a:prstGeom prst="roundRect">
+              <a:avLst/>
+            </a:prstGeom>
+          </p:spPr>
+          <p:style>
+            <a:lnRef idx="2">
+              <a:schemeClr val="dk1"/>
+            </a:lnRef>
+            <a:fillRef idx="1">
+              <a:schemeClr val="lt1"/>
+            </a:fillRef>
+            <a:effectRef idx="0">
+              <a:schemeClr val="dk1"/>
+            </a:effectRef>
+            <a:fontRef idx="minor">
+              <a:schemeClr val="dk1"/>
+            </a:fontRef>
+          </p:style>
+          <p:txBody>
+            <a:bodyPr rtlCol="0" anchor="ctr"/>
+            <a:lstStyle/>
+            <a:p>
+              <a:pPr algn="ctr"/>
+              <a:endParaRPr lang="ko-KR" altLang="en-US"/>
+            </a:p>
+          </p:txBody>
+        </p:sp>
+        <p:sp>
+          <p:nvSpPr>
+            <p:cNvPr id="69" name="모서리가 둥근 직사각형 68"/>
+            <p:cNvSpPr/>
+            <p:nvPr/>
+          </p:nvSpPr>
+          <p:spPr>
+            <a:xfrm>
+              <a:off x="2771800" y="1268760"/>
+              <a:ext cx="288032" cy="576064"/>
+            </a:xfrm>
+            <a:prstGeom prst="roundRect">
+              <a:avLst/>
+            </a:prstGeom>
+          </p:spPr>
+          <p:style>
+            <a:lnRef idx="2">
+              <a:schemeClr val="dk1"/>
+            </a:lnRef>
+            <a:fillRef idx="1">
+              <a:schemeClr val="lt1"/>
+            </a:fillRef>
+            <a:effectRef idx="0">
+              <a:schemeClr val="dk1"/>
+            </a:effectRef>
+            <a:fontRef idx="minor">
+              <a:schemeClr val="dk1"/>
+            </a:fontRef>
+          </p:style>
+          <p:txBody>
+            <a:bodyPr rtlCol="0" anchor="ctr"/>
+            <a:lstStyle/>
+            <a:p>
+              <a:pPr algn="ctr"/>
+              <a:endParaRPr lang="ko-KR" altLang="en-US"/>
+            </a:p>
+          </p:txBody>
+        </p:sp>
+      </p:grpSp>
+      <p:grpSp>
+        <p:nvGrpSpPr>
+          <p:cNvPr id="70" name="그룹 69"/>
+          <p:cNvGrpSpPr/>
+          <p:nvPr/>
+        </p:nvGrpSpPr>
+        <p:grpSpPr>
+          <a:xfrm>
+            <a:off x="2500637" y="5726904"/>
+            <a:ext cx="1224136" cy="360040"/>
+            <a:chOff x="971600" y="1268760"/>
+            <a:chExt cx="2088232" cy="576064"/>
+          </a:xfrm>
+        </p:grpSpPr>
+        <p:sp>
+          <p:nvSpPr>
+            <p:cNvPr id="71" name="모서리가 둥근 직사각형 70"/>
+            <p:cNvSpPr/>
+            <p:nvPr/>
+          </p:nvSpPr>
+          <p:spPr>
+            <a:xfrm>
+              <a:off x="971600" y="1268760"/>
+              <a:ext cx="2088232" cy="576064"/>
+            </a:xfrm>
+            <a:prstGeom prst="roundRect">
+              <a:avLst/>
+            </a:prstGeom>
+          </p:spPr>
+          <p:style>
+            <a:lnRef idx="2">
+              <a:schemeClr val="dk1"/>
+            </a:lnRef>
+            <a:fillRef idx="1">
+              <a:schemeClr val="lt1"/>
+            </a:fillRef>
+            <a:effectRef idx="0">
+              <a:schemeClr val="dk1"/>
+            </a:effectRef>
+            <a:fontRef idx="minor">
+              <a:schemeClr val="dk1"/>
+            </a:fontRef>
+          </p:style>
+          <p:txBody>
+            <a:bodyPr rtlCol="0" anchor="ctr"/>
+            <a:lstStyle/>
+            <a:p>
+              <a:pPr algn="ctr"/>
+              <a:r>
+                <a:rPr lang="en-US" altLang="ko-KR" dirty="0" smtClean="0"/>
+                <a:t>0</a:t>
+              </a:r>
+              <a:endParaRPr lang="ko-KR" altLang="en-US" dirty="0"/>
+            </a:p>
+          </p:txBody>
+        </p:sp>
+        <p:sp>
+          <p:nvSpPr>
+            <p:cNvPr id="72" name="모서리가 둥근 직사각형 71"/>
+            <p:cNvSpPr/>
+            <p:nvPr/>
+          </p:nvSpPr>
+          <p:spPr>
+            <a:xfrm>
+              <a:off x="971600" y="1268760"/>
+              <a:ext cx="288032" cy="576064"/>
+            </a:xfrm>
+            <a:prstGeom prst="roundRect">
+              <a:avLst/>
+            </a:prstGeom>
+          </p:spPr>
+          <p:style>
+            <a:lnRef idx="2">
+              <a:schemeClr val="dk1"/>
+            </a:lnRef>
+            <a:fillRef idx="1">
+              <a:schemeClr val="lt1"/>
+            </a:fillRef>
+            <a:effectRef idx="0">
+              <a:schemeClr val="dk1"/>
+            </a:effectRef>
+            <a:fontRef idx="minor">
+              <a:schemeClr val="dk1"/>
+            </a:fontRef>
+          </p:style>
+          <p:txBody>
+            <a:bodyPr rtlCol="0" anchor="ctr"/>
+            <a:lstStyle/>
+            <a:p>
+              <a:pPr algn="ctr"/>
+              <a:endParaRPr lang="ko-KR" altLang="en-US"/>
+            </a:p>
+          </p:txBody>
+        </p:sp>
+        <p:sp>
+          <p:nvSpPr>
+            <p:cNvPr id="73" name="모서리가 둥근 직사각형 72"/>
+            <p:cNvSpPr/>
+            <p:nvPr/>
+          </p:nvSpPr>
+          <p:spPr>
+            <a:xfrm>
+              <a:off x="2771800" y="1268760"/>
+              <a:ext cx="288032" cy="576064"/>
+            </a:xfrm>
+            <a:prstGeom prst="roundRect">
+              <a:avLst/>
+            </a:prstGeom>
+          </p:spPr>
+          <p:style>
+            <a:lnRef idx="2">
+              <a:schemeClr val="dk1"/>
+            </a:lnRef>
+            <a:fillRef idx="1">
+              <a:schemeClr val="lt1"/>
+            </a:fillRef>
+            <a:effectRef idx="0">
+              <a:schemeClr val="dk1"/>
+            </a:effectRef>
+            <a:fontRef idx="minor">
+              <a:schemeClr val="dk1"/>
+            </a:fontRef>
+          </p:style>
+          <p:txBody>
+            <a:bodyPr rtlCol="0" anchor="ctr"/>
+            <a:lstStyle/>
+            <a:p>
+              <a:pPr algn="ctr"/>
+              <a:endParaRPr lang="ko-KR" altLang="en-US"/>
+            </a:p>
+          </p:txBody>
+        </p:sp>
+      </p:grpSp>
+      <p:cxnSp>
+        <p:nvCxnSpPr>
+          <p:cNvPr id="74" name="구부러진 연결선 73"/>
+          <p:cNvCxnSpPr>
+            <a:stCxn id="68" idx="0"/>
+            <a:endCxn id="79" idx="0"/>
+          </p:cNvCxnSpPr>
+          <p:nvPr/>
+        </p:nvCxnSpPr>
+        <p:spPr>
+          <a:xfrm rot="16200000" flipH="1">
+            <a:off x="2698992" y="3747299"/>
+            <a:ext cx="6351" cy="3965560"/>
+          </a:xfrm>
+          <a:prstGeom prst="curvedConnector3">
+            <a:avLst>
+              <a:gd name="adj1" fmla="val -3599433"/>
+            </a:avLst>
+          </a:prstGeom>
+          <a:ln>
+            <a:tailEnd type="arrow"/>
+          </a:ln>
+        </p:spPr>
+        <p:style>
+          <a:lnRef idx="1">
+            <a:schemeClr val="accent1"/>
+          </a:lnRef>
+          <a:fillRef idx="0">
+            <a:schemeClr val="accent1"/>
+          </a:fillRef>
+          <a:effectRef idx="0">
+            <a:schemeClr val="accent1"/>
+          </a:effectRef>
+          <a:fontRef idx="minor">
+            <a:schemeClr val="tx1"/>
+          </a:fontRef>
+        </p:style>
+      </p:cxnSp>
+      <p:cxnSp>
+        <p:nvCxnSpPr>
+          <p:cNvPr id="75" name="구부러진 연결선 74"/>
+          <p:cNvCxnSpPr>
+            <a:stCxn id="69" idx="0"/>
+            <a:endCxn id="71" idx="0"/>
+          </p:cNvCxnSpPr>
+          <p:nvPr/>
+        </p:nvCxnSpPr>
+        <p:spPr>
+          <a:xfrm rot="5400000" flipH="1" flipV="1">
+            <a:off x="2443691" y="5057891"/>
+            <a:ext cx="12700" cy="1338027"/>
+          </a:xfrm>
+          <a:prstGeom prst="curvedConnector3">
+            <a:avLst>
+              <a:gd name="adj1" fmla="val 1800000"/>
+            </a:avLst>
+          </a:prstGeom>
+          <a:ln>
+            <a:tailEnd type="arrow"/>
+          </a:ln>
+        </p:spPr>
+        <p:style>
+          <a:lnRef idx="1">
+            <a:schemeClr val="accent1"/>
+          </a:lnRef>
+          <a:fillRef idx="0">
+            <a:schemeClr val="accent1"/>
+          </a:fillRef>
+          <a:effectRef idx="0">
+            <a:schemeClr val="accent1"/>
+          </a:effectRef>
+          <a:fontRef idx="minor">
+            <a:schemeClr val="tx1"/>
+          </a:fontRef>
+        </p:style>
+      </p:cxnSp>
+      <p:cxnSp>
+        <p:nvCxnSpPr>
+          <p:cNvPr id="76" name="구부러진 연결선 75"/>
+          <p:cNvCxnSpPr>
+            <a:stCxn id="72" idx="2"/>
+            <a:endCxn id="67" idx="2"/>
+          </p:cNvCxnSpPr>
+          <p:nvPr/>
+        </p:nvCxnSpPr>
+        <p:spPr>
+          <a:xfrm rot="5400000">
+            <a:off x="1916047" y="5417931"/>
+            <a:ext cx="12700" cy="1338027"/>
+          </a:xfrm>
+          <a:prstGeom prst="curvedConnector3">
+            <a:avLst>
+              <a:gd name="adj1" fmla="val 1800000"/>
+            </a:avLst>
+          </a:prstGeom>
+          <a:ln>
+            <a:tailEnd type="arrow"/>
+          </a:ln>
+        </p:spPr>
+        <p:style>
+          <a:lnRef idx="1">
+            <a:schemeClr val="accent1"/>
+          </a:lnRef>
+          <a:fillRef idx="0">
+            <a:schemeClr val="accent1"/>
+          </a:fillRef>
+          <a:effectRef idx="0">
+            <a:schemeClr val="accent1"/>
+          </a:effectRef>
+          <a:fontRef idx="minor">
+            <a:schemeClr val="tx1"/>
+          </a:fontRef>
+        </p:style>
+      </p:cxnSp>
+      <p:cxnSp>
+        <p:nvCxnSpPr>
+          <p:cNvPr id="77" name="구부러진 연결선 76"/>
+          <p:cNvCxnSpPr>
+            <a:stCxn id="81" idx="2"/>
+            <a:endCxn id="67" idx="2"/>
+          </p:cNvCxnSpPr>
+          <p:nvPr/>
+        </p:nvCxnSpPr>
+        <p:spPr>
+          <a:xfrm rot="5400000" flipH="1">
+            <a:off x="3226637" y="4107340"/>
+            <a:ext cx="6351" cy="3965560"/>
+          </a:xfrm>
+          <a:prstGeom prst="curvedConnector3">
+            <a:avLst>
+              <a:gd name="adj1" fmla="val -3599433"/>
+            </a:avLst>
+          </a:prstGeom>
+          <a:ln>
+            <a:tailEnd type="arrow"/>
+          </a:ln>
+        </p:spPr>
+        <p:style>
+          <a:lnRef idx="1">
+            <a:schemeClr val="accent1"/>
+          </a:lnRef>
+          <a:fillRef idx="0">
+            <a:schemeClr val="accent1"/>
+          </a:fillRef>
+          <a:effectRef idx="0">
+            <a:schemeClr val="accent1"/>
+          </a:effectRef>
+          <a:fontRef idx="minor">
+            <a:schemeClr val="tx1"/>
+          </a:fontRef>
+        </p:style>
+      </p:cxnSp>
+      <p:grpSp>
+        <p:nvGrpSpPr>
+          <p:cNvPr id="78" name="그룹 77"/>
+          <p:cNvGrpSpPr/>
+          <p:nvPr/>
+        </p:nvGrpSpPr>
+        <p:grpSpPr>
+          <a:xfrm>
+            <a:off x="4072880" y="5733255"/>
+            <a:ext cx="1224136" cy="360040"/>
+            <a:chOff x="971600" y="1268760"/>
+            <a:chExt cx="2088232" cy="576064"/>
+          </a:xfrm>
+        </p:grpSpPr>
+        <p:sp>
+          <p:nvSpPr>
+            <p:cNvPr id="79" name="모서리가 둥근 직사각형 78"/>
+            <p:cNvSpPr/>
+            <p:nvPr/>
+          </p:nvSpPr>
+          <p:spPr>
+            <a:xfrm>
+              <a:off x="971600" y="1268760"/>
+              <a:ext cx="2088232" cy="576064"/>
+            </a:xfrm>
+            <a:prstGeom prst="roundRect">
+              <a:avLst/>
+            </a:prstGeom>
+          </p:spPr>
+          <p:style>
+            <a:lnRef idx="2">
+              <a:schemeClr val="dk1"/>
+            </a:lnRef>
+            <a:fillRef idx="1">
+              <a:schemeClr val="lt1"/>
+            </a:fillRef>
+            <a:effectRef idx="0">
+              <a:schemeClr val="dk1"/>
+            </a:effectRef>
+            <a:fontRef idx="minor">
+              <a:schemeClr val="dk1"/>
+            </a:fontRef>
+          </p:style>
+          <p:txBody>
+            <a:bodyPr rtlCol="0" anchor="ctr"/>
+            <a:lstStyle/>
+            <a:p>
+              <a:pPr algn="ctr"/>
+              <a:r>
+                <a:rPr lang="en-US" altLang="ko-KR" dirty="0" smtClean="0"/>
+                <a:t>head</a:t>
+              </a:r>
+              <a:endParaRPr lang="ko-KR" altLang="en-US" dirty="0"/>
+            </a:p>
+          </p:txBody>
+        </p:sp>
+        <p:sp>
+          <p:nvSpPr>
+            <p:cNvPr id="80" name="모서리가 둥근 직사각형 79"/>
+            <p:cNvSpPr/>
+            <p:nvPr/>
+          </p:nvSpPr>
+          <p:spPr>
+            <a:xfrm>
+              <a:off x="971600" y="1268760"/>
+              <a:ext cx="288032" cy="576064"/>
+            </a:xfrm>
+            <a:prstGeom prst="roundRect">
+              <a:avLst/>
+            </a:prstGeom>
+          </p:spPr>
+          <p:style>
+            <a:lnRef idx="2">
+              <a:schemeClr val="dk1"/>
+            </a:lnRef>
+            <a:fillRef idx="1">
+              <a:schemeClr val="lt1"/>
+            </a:fillRef>
+            <a:effectRef idx="0">
+              <a:schemeClr val="dk1"/>
+            </a:effectRef>
+            <a:fontRef idx="minor">
+              <a:schemeClr val="dk1"/>
+            </a:fontRef>
+          </p:style>
+          <p:txBody>
+            <a:bodyPr rtlCol="0" anchor="ctr"/>
+            <a:lstStyle/>
+            <a:p>
+              <a:pPr algn="ctr"/>
+              <a:endParaRPr lang="ko-KR" altLang="en-US"/>
+            </a:p>
+          </p:txBody>
+        </p:sp>
+        <p:sp>
+          <p:nvSpPr>
+            <p:cNvPr id="81" name="모서리가 둥근 직사각형 80"/>
+            <p:cNvSpPr/>
+            <p:nvPr/>
+          </p:nvSpPr>
+          <p:spPr>
+            <a:xfrm>
+              <a:off x="2771800" y="1268760"/>
+              <a:ext cx="288032" cy="576064"/>
+            </a:xfrm>
+            <a:prstGeom prst="roundRect">
+              <a:avLst/>
+            </a:prstGeom>
+          </p:spPr>
+          <p:style>
+            <a:lnRef idx="2">
+              <a:schemeClr val="dk1"/>
+            </a:lnRef>
+            <a:fillRef idx="1">
+              <a:schemeClr val="lt1"/>
+            </a:fillRef>
+            <a:effectRef idx="0">
+              <a:schemeClr val="dk1"/>
+            </a:effectRef>
+            <a:fontRef idx="minor">
+              <a:schemeClr val="dk1"/>
+            </a:fontRef>
+          </p:style>
+          <p:txBody>
+            <a:bodyPr rtlCol="0" anchor="ctr"/>
+            <a:lstStyle/>
+            <a:p>
+              <a:pPr algn="ctr"/>
+              <a:endParaRPr lang="ko-KR" altLang="en-US"/>
+            </a:p>
+          </p:txBody>
+        </p:sp>
+      </p:grpSp>
+      <p:cxnSp>
+        <p:nvCxnSpPr>
+          <p:cNvPr id="82" name="구부러진 연결선 81"/>
+          <p:cNvCxnSpPr>
+            <a:stCxn id="80" idx="2"/>
+            <a:endCxn id="71" idx="2"/>
+          </p:cNvCxnSpPr>
+          <p:nvPr/>
+        </p:nvCxnSpPr>
+        <p:spPr>
+          <a:xfrm rot="5400000" flipH="1">
+            <a:off x="3631828" y="5567821"/>
+            <a:ext cx="6351" cy="1044598"/>
+          </a:xfrm>
+          <a:prstGeom prst="curvedConnector3">
+            <a:avLst>
+              <a:gd name="adj1" fmla="val -3599433"/>
+            </a:avLst>
+          </a:prstGeom>
+          <a:ln>
+            <a:tailEnd type="arrow"/>
+          </a:ln>
+        </p:spPr>
+        <p:style>
+          <a:lnRef idx="1">
+            <a:schemeClr val="accent1"/>
+          </a:lnRef>
+          <a:fillRef idx="0">
+            <a:schemeClr val="accent1"/>
+          </a:fillRef>
+          <a:effectRef idx="0">
+            <a:schemeClr val="accent1"/>
+          </a:effectRef>
+          <a:fontRef idx="minor">
+            <a:schemeClr val="tx1"/>
+          </a:fontRef>
+        </p:style>
+      </p:cxnSp>
+      <p:cxnSp>
+        <p:nvCxnSpPr>
+          <p:cNvPr id="83" name="구부러진 연결선 82"/>
+          <p:cNvCxnSpPr>
+            <a:stCxn id="73" idx="0"/>
+            <a:endCxn id="79" idx="0"/>
+          </p:cNvCxnSpPr>
+          <p:nvPr/>
+        </p:nvCxnSpPr>
+        <p:spPr>
+          <a:xfrm rot="16200000" flipH="1">
+            <a:off x="4159473" y="5207780"/>
+            <a:ext cx="6351" cy="1044598"/>
+          </a:xfrm>
+          <a:prstGeom prst="curvedConnector3">
+            <a:avLst>
+              <a:gd name="adj1" fmla="val -3599433"/>
+            </a:avLst>
+          </a:prstGeom>
+          <a:ln>
+            <a:tailEnd type="arrow"/>
+          </a:ln>
+        </p:spPr>
+        <p:style>
+          <a:lnRef idx="1">
+            <a:schemeClr val="accent1"/>
+          </a:lnRef>
+          <a:fillRef idx="0">
+            <a:schemeClr val="accent1"/>
+          </a:fillRef>
+          <a:effectRef idx="0">
+            <a:schemeClr val="accent1"/>
+          </a:effectRef>
+          <a:fontRef idx="minor">
+            <a:schemeClr val="tx1"/>
+          </a:fontRef>
+        </p:style>
+      </p:cxnSp>
+      <p:sp>
+        <p:nvSpPr>
+          <p:cNvPr id="84" name="직사각형 83"/>
+          <p:cNvSpPr/>
+          <p:nvPr/>
+        </p:nvSpPr>
+        <p:spPr>
+          <a:xfrm>
+            <a:off x="4320480" y="1034406"/>
+            <a:ext cx="4572000" cy="769441"/>
+          </a:xfrm>
+          <a:prstGeom prst="rect">
+            <a:avLst/>
+          </a:prstGeom>
+        </p:spPr>
+        <p:txBody>
+          <a:bodyPr>
+            <a:spAutoFit/>
+          </a:bodyPr>
+          <a:lstStyle/>
+          <a:p>
+            <a:r>
+              <a:rPr lang="en-US" altLang="ko-KR" sz="1100" dirty="0" smtClean="0"/>
+              <a:t>static inline void </a:t>
+            </a:r>
+            <a:r>
+              <a:rPr lang="en-US" altLang="ko-KR" sz="1100" dirty="0" err="1" smtClean="0"/>
+              <a:t>list_add</a:t>
+            </a:r>
+            <a:r>
+              <a:rPr lang="en-US" altLang="ko-KR" sz="1100" dirty="0" smtClean="0"/>
+              <a:t>(</a:t>
+            </a:r>
+            <a:r>
+              <a:rPr lang="en-US" altLang="ko-KR" sz="1100" dirty="0" err="1" smtClean="0"/>
+              <a:t>struct</a:t>
+            </a:r>
+            <a:r>
+              <a:rPr lang="en-US" altLang="ko-KR" sz="1100" dirty="0" smtClean="0"/>
+              <a:t> </a:t>
+            </a:r>
+            <a:r>
+              <a:rPr lang="en-US" altLang="ko-KR" sz="1100" dirty="0" err="1" smtClean="0"/>
+              <a:t>list_head</a:t>
+            </a:r>
+            <a:r>
+              <a:rPr lang="en-US" altLang="ko-KR" sz="1100" dirty="0" smtClean="0"/>
+              <a:t> *new, </a:t>
+            </a:r>
+            <a:r>
+              <a:rPr lang="en-US" altLang="ko-KR" sz="1100" dirty="0" err="1" smtClean="0"/>
+              <a:t>struct</a:t>
+            </a:r>
+            <a:r>
+              <a:rPr lang="en-US" altLang="ko-KR" sz="1100" dirty="0" smtClean="0"/>
+              <a:t> </a:t>
+            </a:r>
+            <a:r>
+              <a:rPr lang="en-US" altLang="ko-KR" sz="1100" dirty="0" err="1" smtClean="0"/>
+              <a:t>list_head</a:t>
+            </a:r>
+            <a:r>
+              <a:rPr lang="en-US" altLang="ko-KR" sz="1100" dirty="0" smtClean="0"/>
+              <a:t> *head)</a:t>
+            </a:r>
+          </a:p>
+          <a:p>
+            <a:r>
+              <a:rPr lang="en-US" altLang="ko-KR" sz="1100" dirty="0" smtClean="0"/>
+              <a:t>{</a:t>
+            </a:r>
+          </a:p>
+          <a:p>
+            <a:r>
+              <a:rPr lang="en-US" altLang="ko-KR" sz="1100" dirty="0" smtClean="0"/>
+              <a:t>    __</a:t>
+            </a:r>
+            <a:r>
+              <a:rPr lang="en-US" altLang="ko-KR" sz="1100" dirty="0" err="1" smtClean="0"/>
+              <a:t>list_add</a:t>
+            </a:r>
+            <a:r>
+              <a:rPr lang="en-US" altLang="ko-KR" sz="1100" dirty="0" smtClean="0"/>
+              <a:t>(new</a:t>
+            </a:r>
+            <a:r>
+              <a:rPr lang="en-US" altLang="ko-KR" sz="1100" b="1" dirty="0" smtClean="0">
+                <a:solidFill>
+                  <a:srgbClr val="FF0000"/>
+                </a:solidFill>
+              </a:rPr>
+              <a:t>, head, head-&gt;next</a:t>
+            </a:r>
+            <a:r>
+              <a:rPr lang="en-US" altLang="ko-KR" sz="1100" dirty="0" smtClean="0"/>
+              <a:t>);</a:t>
+            </a:r>
+          </a:p>
+          <a:p>
+            <a:r>
+              <a:rPr lang="en-US" altLang="ko-KR" sz="1100" dirty="0" smtClean="0"/>
+              <a:t>}</a:t>
+            </a:r>
+            <a:endParaRPr lang="ko-KR" altLang="en-US" sz="1100" dirty="0"/>
+          </a:p>
+        </p:txBody>
+      </p:sp>
+      <p:sp>
+        <p:nvSpPr>
+          <p:cNvPr id="85" name="직사각형 84"/>
+          <p:cNvSpPr/>
+          <p:nvPr/>
+        </p:nvSpPr>
+        <p:spPr>
+          <a:xfrm>
+            <a:off x="4224343" y="3451647"/>
+            <a:ext cx="4956169" cy="769441"/>
+          </a:xfrm>
+          <a:prstGeom prst="rect">
+            <a:avLst/>
+          </a:prstGeom>
+        </p:spPr>
+        <p:txBody>
+          <a:bodyPr wrap="square">
+            <a:spAutoFit/>
+          </a:bodyPr>
+          <a:lstStyle/>
+          <a:p>
+            <a:r>
+              <a:rPr lang="en-US" altLang="ko-KR" sz="1100" dirty="0" smtClean="0"/>
+              <a:t>static inline void </a:t>
+            </a:r>
+            <a:r>
+              <a:rPr lang="en-US" altLang="ko-KR" sz="1100" dirty="0" err="1" smtClean="0"/>
+              <a:t>list_add_tail</a:t>
+            </a:r>
+            <a:r>
+              <a:rPr lang="en-US" altLang="ko-KR" sz="1100" dirty="0" smtClean="0"/>
+              <a:t>(</a:t>
+            </a:r>
+            <a:r>
+              <a:rPr lang="en-US" altLang="ko-KR" sz="1100" dirty="0" err="1" smtClean="0"/>
+              <a:t>struct</a:t>
+            </a:r>
+            <a:r>
+              <a:rPr lang="en-US" altLang="ko-KR" sz="1100" dirty="0" smtClean="0"/>
+              <a:t> </a:t>
+            </a:r>
+            <a:r>
+              <a:rPr lang="en-US" altLang="ko-KR" sz="1100" dirty="0" err="1" smtClean="0"/>
+              <a:t>list_head</a:t>
+            </a:r>
+            <a:r>
+              <a:rPr lang="en-US" altLang="ko-KR" sz="1100" dirty="0" smtClean="0"/>
+              <a:t> *new, </a:t>
+            </a:r>
+            <a:r>
+              <a:rPr lang="en-US" altLang="ko-KR" sz="1100" dirty="0" err="1" smtClean="0"/>
+              <a:t>struct</a:t>
+            </a:r>
+            <a:r>
+              <a:rPr lang="en-US" altLang="ko-KR" sz="1100" dirty="0" smtClean="0"/>
+              <a:t> </a:t>
+            </a:r>
+            <a:r>
+              <a:rPr lang="en-US" altLang="ko-KR" sz="1100" dirty="0" err="1" smtClean="0"/>
+              <a:t>list_head</a:t>
+            </a:r>
+            <a:r>
+              <a:rPr lang="en-US" altLang="ko-KR" sz="1100" dirty="0" smtClean="0"/>
+              <a:t> *head)</a:t>
+            </a:r>
+          </a:p>
+          <a:p>
+            <a:r>
+              <a:rPr lang="en-US" altLang="ko-KR" sz="1100" dirty="0" smtClean="0"/>
+              <a:t>{</a:t>
+            </a:r>
+          </a:p>
+          <a:p>
+            <a:r>
+              <a:rPr lang="en-US" altLang="ko-KR" sz="1100" dirty="0" smtClean="0"/>
+              <a:t>    __</a:t>
+            </a:r>
+            <a:r>
+              <a:rPr lang="en-US" altLang="ko-KR" sz="1100" dirty="0" err="1" smtClean="0"/>
+              <a:t>list_add</a:t>
+            </a:r>
+            <a:r>
+              <a:rPr lang="en-US" altLang="ko-KR" sz="1100" dirty="0" smtClean="0"/>
+              <a:t>(new, </a:t>
+            </a:r>
+            <a:r>
+              <a:rPr lang="en-US" altLang="ko-KR" sz="1100" b="1" dirty="0" smtClean="0">
+                <a:solidFill>
+                  <a:srgbClr val="FF0000"/>
+                </a:solidFill>
+              </a:rPr>
+              <a:t>head-&gt;</a:t>
+            </a:r>
+            <a:r>
+              <a:rPr lang="en-US" altLang="ko-KR" sz="1100" b="1" dirty="0" err="1" smtClean="0">
+                <a:solidFill>
+                  <a:srgbClr val="FF0000"/>
+                </a:solidFill>
+              </a:rPr>
+              <a:t>prev</a:t>
+            </a:r>
+            <a:r>
+              <a:rPr lang="en-US" altLang="ko-KR" sz="1100" b="1" dirty="0" smtClean="0">
+                <a:solidFill>
+                  <a:srgbClr val="FF0000"/>
+                </a:solidFill>
+              </a:rPr>
+              <a:t>, head</a:t>
+            </a:r>
+            <a:r>
+              <a:rPr lang="en-US" altLang="ko-KR" sz="1100" dirty="0" smtClean="0"/>
+              <a:t>);</a:t>
+            </a:r>
+          </a:p>
+          <a:p>
+            <a:r>
+              <a:rPr lang="en-US" altLang="ko-KR" sz="1100" dirty="0" smtClean="0"/>
+              <a:t>}</a:t>
+            </a:r>
+            <a:endParaRPr lang="ko-KR" altLang="en-US" sz="1100" dirty="0"/>
+          </a:p>
+        </p:txBody>
+      </p:sp>
+      <p:sp>
+        <p:nvSpPr>
+          <p:cNvPr id="86" name="직사각형 85"/>
+          <p:cNvSpPr/>
+          <p:nvPr/>
+        </p:nvSpPr>
+        <p:spPr>
+          <a:xfrm>
+            <a:off x="5580112" y="4943353"/>
+            <a:ext cx="3456384" cy="1615827"/>
+          </a:xfrm>
+          <a:prstGeom prst="rect">
+            <a:avLst/>
+          </a:prstGeom>
+        </p:spPr>
+        <p:txBody>
+          <a:bodyPr wrap="square">
+            <a:spAutoFit/>
+          </a:bodyPr>
+          <a:lstStyle/>
+          <a:p>
+            <a:r>
+              <a:rPr lang="en-US" altLang="ko-KR" sz="1100" dirty="0" smtClean="0"/>
+              <a:t>static inline void __</a:t>
+            </a:r>
+            <a:r>
+              <a:rPr lang="en-US" altLang="ko-KR" sz="1100" dirty="0" err="1" smtClean="0"/>
+              <a:t>list_add</a:t>
+            </a:r>
+            <a:r>
+              <a:rPr lang="en-US" altLang="ko-KR" sz="1100" dirty="0" smtClean="0"/>
+              <a:t>(</a:t>
+            </a:r>
+            <a:r>
+              <a:rPr lang="en-US" altLang="ko-KR" sz="1100" dirty="0" err="1" smtClean="0"/>
+              <a:t>struct</a:t>
+            </a:r>
+            <a:r>
+              <a:rPr lang="en-US" altLang="ko-KR" sz="1100" dirty="0" smtClean="0"/>
+              <a:t> </a:t>
+            </a:r>
+            <a:r>
+              <a:rPr lang="en-US" altLang="ko-KR" sz="1100" dirty="0" err="1" smtClean="0"/>
+              <a:t>list_head</a:t>
+            </a:r>
+            <a:r>
+              <a:rPr lang="en-US" altLang="ko-KR" sz="1100" dirty="0" smtClean="0"/>
+              <a:t> *new,</a:t>
+            </a:r>
+          </a:p>
+          <a:p>
+            <a:r>
+              <a:rPr lang="en-US" altLang="ko-KR" sz="1100" dirty="0" smtClean="0"/>
+              <a:t>                  </a:t>
+            </a:r>
+            <a:r>
+              <a:rPr lang="en-US" altLang="ko-KR" sz="1100" b="1" dirty="0" err="1" smtClean="0">
+                <a:solidFill>
+                  <a:srgbClr val="FF0000"/>
+                </a:solidFill>
+              </a:rPr>
+              <a:t>struct</a:t>
+            </a:r>
+            <a:r>
+              <a:rPr lang="en-US" altLang="ko-KR" sz="1100" b="1" dirty="0" smtClean="0">
+                <a:solidFill>
+                  <a:srgbClr val="FF0000"/>
+                </a:solidFill>
+              </a:rPr>
+              <a:t> </a:t>
+            </a:r>
+            <a:r>
+              <a:rPr lang="en-US" altLang="ko-KR" sz="1100" b="1" dirty="0" err="1" smtClean="0">
+                <a:solidFill>
+                  <a:srgbClr val="FF0000"/>
+                </a:solidFill>
+              </a:rPr>
+              <a:t>list_head</a:t>
+            </a:r>
+            <a:r>
+              <a:rPr lang="en-US" altLang="ko-KR" sz="1100" b="1" dirty="0" smtClean="0">
+                <a:solidFill>
+                  <a:srgbClr val="FF0000"/>
+                </a:solidFill>
+              </a:rPr>
+              <a:t> *</a:t>
+            </a:r>
+            <a:r>
+              <a:rPr lang="en-US" altLang="ko-KR" sz="1100" b="1" dirty="0" err="1" smtClean="0">
+                <a:solidFill>
+                  <a:srgbClr val="FF0000"/>
+                </a:solidFill>
+              </a:rPr>
+              <a:t>prev</a:t>
+            </a:r>
+            <a:r>
+              <a:rPr lang="en-US" altLang="ko-KR" sz="1100" b="1" dirty="0" smtClean="0"/>
+              <a:t>,</a:t>
+            </a:r>
+          </a:p>
+          <a:p>
+            <a:r>
+              <a:rPr lang="en-US" altLang="ko-KR" sz="1100" dirty="0" smtClean="0"/>
+              <a:t>                  </a:t>
+            </a:r>
+            <a:r>
+              <a:rPr lang="en-US" altLang="ko-KR" sz="1100" b="1" dirty="0" err="1" smtClean="0">
+                <a:solidFill>
+                  <a:srgbClr val="FF0000"/>
+                </a:solidFill>
+              </a:rPr>
+              <a:t>struct</a:t>
+            </a:r>
+            <a:r>
+              <a:rPr lang="en-US" altLang="ko-KR" sz="1100" b="1" dirty="0" smtClean="0">
+                <a:solidFill>
+                  <a:srgbClr val="FF0000"/>
+                </a:solidFill>
+              </a:rPr>
+              <a:t> </a:t>
+            </a:r>
+            <a:r>
+              <a:rPr lang="en-US" altLang="ko-KR" sz="1100" b="1" dirty="0" err="1" smtClean="0">
+                <a:solidFill>
+                  <a:srgbClr val="FF0000"/>
+                </a:solidFill>
+              </a:rPr>
+              <a:t>list_head</a:t>
+            </a:r>
+            <a:r>
+              <a:rPr lang="en-US" altLang="ko-KR" sz="1100" b="1" dirty="0" smtClean="0">
+                <a:solidFill>
+                  <a:srgbClr val="FF0000"/>
+                </a:solidFill>
+              </a:rPr>
+              <a:t> *next</a:t>
+            </a:r>
+            <a:r>
+              <a:rPr lang="en-US" altLang="ko-KR" sz="1100" dirty="0" smtClean="0"/>
+              <a:t>)</a:t>
+            </a:r>
+          </a:p>
+          <a:p>
+            <a:r>
+              <a:rPr lang="en-US" altLang="ko-KR" sz="1100" dirty="0" smtClean="0"/>
+              <a:t>{</a:t>
+            </a:r>
+          </a:p>
+          <a:p>
+            <a:r>
+              <a:rPr lang="en-US" altLang="ko-KR" sz="1100" dirty="0" smtClean="0"/>
+              <a:t>    next-&gt;</a:t>
+            </a:r>
+            <a:r>
+              <a:rPr lang="en-US" altLang="ko-KR" sz="1100" dirty="0" err="1" smtClean="0"/>
+              <a:t>prev</a:t>
+            </a:r>
+            <a:r>
+              <a:rPr lang="en-US" altLang="ko-KR" sz="1100" dirty="0" smtClean="0"/>
+              <a:t> = new;</a:t>
+            </a:r>
+          </a:p>
+          <a:p>
+            <a:r>
+              <a:rPr lang="en-US" altLang="ko-KR" sz="1100" dirty="0" smtClean="0"/>
+              <a:t>    new-&gt;next = next;</a:t>
+            </a:r>
+          </a:p>
+          <a:p>
+            <a:r>
+              <a:rPr lang="en-US" altLang="ko-KR" sz="1100" dirty="0" smtClean="0"/>
+              <a:t>    new-&gt;</a:t>
+            </a:r>
+            <a:r>
+              <a:rPr lang="en-US" altLang="ko-KR" sz="1100" dirty="0" err="1" smtClean="0"/>
+              <a:t>prev</a:t>
+            </a:r>
+            <a:r>
+              <a:rPr lang="en-US" altLang="ko-KR" sz="1100" dirty="0" smtClean="0"/>
+              <a:t> = </a:t>
+            </a:r>
+            <a:r>
+              <a:rPr lang="en-US" altLang="ko-KR" sz="1100" dirty="0" err="1" smtClean="0"/>
+              <a:t>prev</a:t>
+            </a:r>
+            <a:r>
+              <a:rPr lang="en-US" altLang="ko-KR" sz="1100" dirty="0" smtClean="0"/>
+              <a:t>;</a:t>
+            </a:r>
+          </a:p>
+          <a:p>
+            <a:r>
+              <a:rPr lang="en-US" altLang="ko-KR" sz="1100" dirty="0" smtClean="0"/>
+              <a:t>    </a:t>
+            </a:r>
+            <a:r>
+              <a:rPr lang="en-US" altLang="ko-KR" sz="1100" dirty="0" err="1" smtClean="0"/>
+              <a:t>prev</a:t>
+            </a:r>
+            <a:r>
+              <a:rPr lang="en-US" altLang="ko-KR" sz="1100" dirty="0" smtClean="0"/>
+              <a:t>-&gt;next = new;</a:t>
+            </a:r>
+          </a:p>
+          <a:p>
+            <a:r>
+              <a:rPr lang="en-US" altLang="ko-KR" sz="1100" dirty="0" smtClean="0"/>
+              <a:t>}</a:t>
+            </a:r>
+            <a:endParaRPr lang="ko-KR" altLang="en-US" sz="1100" dirty="0"/>
+          </a:p>
+        </p:txBody>
+      </p:sp>
+    </p:spTree>
+    <p:extLst>
+      <p:ext uri="{BB962C8B-B14F-4D97-AF65-F5344CB8AC3E}">
+        <p14:creationId xmlns:p14="http://schemas.microsoft.com/office/powerpoint/2010/main" val="2661885721"/>
+      </p:ext>
+    </p:extLst>
+  </p:cSld>
+  <p:clrMapOvr>
+    <a:masterClrMapping/>
+  </p:clrMapOvr>
+</p:sld>
+</file>
+
 <file path=ppt/theme/theme1.xml><?xml version="1.0" encoding="utf-8"?>
 <a:theme xmlns:a="http://schemas.openxmlformats.org/drawingml/2006/main" name="Office 테마">
   <a:themeElements>

</xml_diff>